<commit_message>
Added to direck and indirect Tack
</commit_message>
<xml_diff>
--- a/Presentations/sailboat_Slides.pptx
+++ b/Presentations/sailboat_Slides.pptx
@@ -5,10 +5,10 @@
     <p:sldMasterId id="2147483660" r:id="rId4"/>
   </p:sldMasterIdLst>
   <p:notesMasterIdLst>
-    <p:notesMasterId r:id="rId33"/>
+    <p:notesMasterId r:id="rId35"/>
   </p:notesMasterIdLst>
   <p:handoutMasterIdLst>
-    <p:handoutMasterId r:id="rId34"/>
+    <p:handoutMasterId r:id="rId36"/>
   </p:handoutMasterIdLst>
   <p:sldIdLst>
     <p:sldId id="256" r:id="rId5"/>
@@ -28,17 +28,19 @@
     <p:sldId id="304" r:id="rId19"/>
     <p:sldId id="305" r:id="rId20"/>
     <p:sldId id="317" r:id="rId21"/>
-    <p:sldId id="307" r:id="rId22"/>
-    <p:sldId id="318" r:id="rId23"/>
-    <p:sldId id="308" r:id="rId24"/>
-    <p:sldId id="309" r:id="rId25"/>
-    <p:sldId id="320" r:id="rId26"/>
-    <p:sldId id="310" r:id="rId27"/>
-    <p:sldId id="319" r:id="rId28"/>
-    <p:sldId id="311" r:id="rId29"/>
-    <p:sldId id="312" r:id="rId30"/>
-    <p:sldId id="313" r:id="rId31"/>
-    <p:sldId id="314" r:id="rId32"/>
+    <p:sldId id="331" r:id="rId22"/>
+    <p:sldId id="307" r:id="rId23"/>
+    <p:sldId id="318" r:id="rId24"/>
+    <p:sldId id="308" r:id="rId25"/>
+    <p:sldId id="309" r:id="rId26"/>
+    <p:sldId id="320" r:id="rId27"/>
+    <p:sldId id="310" r:id="rId28"/>
+    <p:sldId id="319" r:id="rId29"/>
+    <p:sldId id="311" r:id="rId30"/>
+    <p:sldId id="312" r:id="rId31"/>
+    <p:sldId id="330" r:id="rId32"/>
+    <p:sldId id="313" r:id="rId33"/>
+    <p:sldId id="314" r:id="rId34"/>
   </p:sldIdLst>
   <p:sldSz cx="9144000" cy="6858000" type="screen4x3"/>
   <p:notesSz cx="6858000" cy="9144000"/>
@@ -811,7 +813,7 @@
           <a:p>
             <a:fld id="{61EF42D5-6E1A-484C-9E8F-C6AC834CA9CA}" type="slidenum">
               <a:rPr lang="en-GB" smtClean="0"/>
-              <a:t>20</a:t>
+              <a:t>21</a:t>
             </a:fld>
             <a:endParaRPr lang="en-GB"/>
           </a:p>
@@ -2880,7 +2882,7 @@
         <p:spPr>
           <a:xfrm>
             <a:off x="0" y="1375962"/>
-            <a:ext cx="1371600" cy="1892826"/>
+            <a:ext cx="1371600" cy="2092881"/>
           </a:xfrm>
           <a:prstGeom prst="rect">
             <a:avLst/>
@@ -3061,7 +3063,7 @@
                 </a:solidFill>
                 <a:latin typeface="Calibri" panose="020F0502020204030204"/>
               </a:rPr>
-              <a:t>Sailboat Physics</a:t>
+              <a:t>Sailboat Simulation</a:t>
             </a:r>
             <a:endParaRPr kumimoji="0" lang="en-US" sz="1300" b="0" i="0" u="none" strike="noStrike" kern="1200" cap="none" spc="0" normalizeH="0" baseline="0" noProof="0" dirty="0">
               <a:ln>
@@ -3593,7 +3595,7 @@
         <p:spPr>
           <a:xfrm>
             <a:off x="0" y="1375962"/>
-            <a:ext cx="1371600" cy="1892826"/>
+            <a:ext cx="1371600" cy="2092881"/>
           </a:xfrm>
           <a:prstGeom prst="rect">
             <a:avLst/>
@@ -3774,7 +3776,7 @@
                 </a:solidFill>
                 <a:latin typeface="Calibri" panose="020F0502020204030204"/>
               </a:rPr>
-              <a:t>Sailboat Physics</a:t>
+              <a:t>Sailboat Simulation</a:t>
             </a:r>
             <a:endParaRPr kumimoji="0" lang="en-US" sz="1300" b="0" i="0" u="none" strike="noStrike" kern="1200" cap="none" spc="0" normalizeH="0" baseline="0" noProof="0" dirty="0">
               <a:ln>
@@ -4184,7 +4186,7 @@
         <p:spPr>
           <a:xfrm>
             <a:off x="0" y="1375962"/>
-            <a:ext cx="1371600" cy="1892826"/>
+            <a:ext cx="1371600" cy="2092881"/>
           </a:xfrm>
           <a:prstGeom prst="rect">
             <a:avLst/>
@@ -4365,7 +4367,7 @@
                 </a:solidFill>
                 <a:latin typeface="Calibri" panose="020F0502020204030204"/>
               </a:rPr>
-              <a:t>Sailboat Physics</a:t>
+              <a:t>Sailboat Simulation</a:t>
             </a:r>
             <a:endParaRPr kumimoji="0" lang="en-US" sz="1300" b="0" i="0" u="none" strike="noStrike" kern="1200" cap="none" spc="0" normalizeH="0" baseline="0" noProof="0" dirty="0">
               <a:ln>
@@ -4880,7 +4882,7 @@
         <p:spPr>
           <a:xfrm>
             <a:off x="0" y="1375962"/>
-            <a:ext cx="1371600" cy="1892826"/>
+            <a:ext cx="1371600" cy="2092881"/>
           </a:xfrm>
           <a:prstGeom prst="rect">
             <a:avLst/>
@@ -5061,7 +5063,7 @@
                 </a:solidFill>
                 <a:latin typeface="Calibri" panose="020F0502020204030204"/>
               </a:rPr>
-              <a:t>Sailboat Physics</a:t>
+              <a:t>Sailboat Simulation</a:t>
             </a:r>
             <a:endParaRPr kumimoji="0" lang="en-US" sz="1300" b="0" i="0" u="none" strike="noStrike" kern="1200" cap="none" spc="0" normalizeH="0" baseline="0" noProof="0" dirty="0">
               <a:ln>
@@ -5379,7 +5381,7 @@
         </p:blipFill>
         <p:spPr>
           <a:xfrm>
-            <a:off x="5769048" y="2405287"/>
+            <a:off x="6076336" y="2604067"/>
             <a:ext cx="3067664" cy="3734921"/>
           </a:xfrm>
           <a:prstGeom prst="rect">
@@ -5402,7 +5404,7 @@
         <p:spPr>
           <a:xfrm>
             <a:off x="0" y="1375962"/>
-            <a:ext cx="1371600" cy="1892826"/>
+            <a:ext cx="1371600" cy="2092881"/>
           </a:xfrm>
           <a:prstGeom prst="rect">
             <a:avLst/>
@@ -5583,7 +5585,7 @@
                 </a:solidFill>
                 <a:latin typeface="Calibri" panose="020F0502020204030204"/>
               </a:rPr>
-              <a:t>Sailboat Physics</a:t>
+              <a:t>Sailboat Simulation</a:t>
             </a:r>
             <a:endParaRPr kumimoji="0" lang="en-US" sz="1300" b="0" i="0" u="none" strike="noStrike" kern="1200" cap="none" spc="0" normalizeH="0" baseline="0" noProof="0" dirty="0">
               <a:ln>
@@ -5762,8 +5764,8 @@
         </p:blipFill>
         <p:spPr>
           <a:xfrm>
-            <a:off x="1691267" y="4826902"/>
-            <a:ext cx="3709132" cy="1185026"/>
+            <a:off x="1740249" y="5558310"/>
+            <a:ext cx="2881317" cy="920548"/>
           </a:xfrm>
           <a:prstGeom prst="rect">
             <a:avLst/>
@@ -5773,6 +5775,36 @@
               <a:lumMod val="65000"/>
             </a:schemeClr>
           </a:solidFill>
+        </p:spPr>
+      </p:pic>
+      <p:pic>
+        <p:nvPicPr>
+          <p:cNvPr id="7" name="Picture 6" descr="A close-up of a black device&#10;&#10;Description automatically generated">
+            <a:extLst>
+              <a:ext uri="{FF2B5EF4-FFF2-40B4-BE49-F238E27FC236}">
+                <a16:creationId xmlns:a16="http://schemas.microsoft.com/office/drawing/2014/main" id="{DA2158C8-1462-6E0A-CC4C-88393DCB18F7}"/>
+              </a:ext>
+            </a:extLst>
+          </p:cNvPr>
+          <p:cNvPicPr>
+            <a:picLocks noChangeAspect="1"/>
+          </p:cNvPicPr>
+          <p:nvPr/>
+        </p:nvPicPr>
+        <p:blipFill>
+          <a:blip r:embed="rId4"/>
+          <a:stretch>
+            <a:fillRect/>
+          </a:stretch>
+        </p:blipFill>
+        <p:spPr>
+          <a:xfrm>
+            <a:off x="4515707" y="3420646"/>
+            <a:ext cx="1723728" cy="3070565"/>
+          </a:xfrm>
+          <a:prstGeom prst="rect">
+            <a:avLst/>
+          </a:prstGeom>
         </p:spPr>
       </p:pic>
     </p:spTree>
@@ -6867,7 +6899,7 @@
         <p:spPr>
           <a:xfrm>
             <a:off x="0" y="1375962"/>
-            <a:ext cx="1371600" cy="1892826"/>
+            <a:ext cx="1371600" cy="2092881"/>
           </a:xfrm>
           <a:prstGeom prst="rect">
             <a:avLst/>
@@ -7048,7 +7080,7 @@
                 </a:solidFill>
                 <a:latin typeface="Calibri" panose="020F0502020204030204"/>
               </a:rPr>
-              <a:t>Sailboat Physics</a:t>
+              <a:t>Sailboat Simulation</a:t>
             </a:r>
             <a:endParaRPr kumimoji="0" lang="en-US" sz="1300" b="0" i="0" u="none" strike="noStrike" kern="1200" cap="none" spc="0" normalizeH="0" baseline="0" noProof="0" dirty="0">
               <a:ln>
@@ -7258,7 +7290,7 @@
           <a:p>
             <a:r>
               <a:rPr lang="en-GB" dirty="0"/>
-              <a:t>Sailboat Physics</a:t>
+              <a:t>Sailboat Simulation</a:t>
             </a:r>
           </a:p>
         </p:txBody>
@@ -7476,7 +7508,7 @@
         <p:spPr>
           <a:xfrm>
             <a:off x="0" y="1375962"/>
-            <a:ext cx="1371600" cy="1892826"/>
+            <a:ext cx="1371600" cy="2092881"/>
           </a:xfrm>
           <a:prstGeom prst="rect">
             <a:avLst/>
@@ -7653,18 +7685,18 @@
             <a:r>
               <a:rPr lang="en-US" sz="1300" dirty="0">
                 <a:solidFill>
-                  <a:schemeClr val="accent4"/>
+                  <a:srgbClr val="F8C302"/>
                 </a:solidFill>
                 <a:latin typeface="Calibri" panose="020F0502020204030204"/>
               </a:rPr>
-              <a:t>Sailboat Physics</a:t>
+              <a:t>Sailboat Simulation</a:t>
             </a:r>
             <a:endParaRPr kumimoji="0" lang="en-US" sz="1300" b="0" i="0" u="none" strike="noStrike" kern="1200" cap="none" spc="0" normalizeH="0" baseline="0" noProof="0" dirty="0">
               <a:ln>
                 <a:noFill/>
               </a:ln>
               <a:solidFill>
-                <a:schemeClr val="accent4"/>
+                <a:srgbClr val="F8C302"/>
               </a:solidFill>
               <a:effectLst/>
               <a:uLnTx/>
@@ -7908,7 +7940,7 @@
           <a:p>
             <a:r>
               <a:rPr lang="en-GB" dirty="0"/>
-              <a:t>Sailboat Physics</a:t>
+              <a:t>Sailboat Simulation</a:t>
             </a:r>
           </a:p>
         </p:txBody>
@@ -7928,7 +7960,7 @@
         <p:spPr>
           <a:xfrm>
             <a:off x="0" y="1375962"/>
-            <a:ext cx="1371600" cy="1892826"/>
+            <a:ext cx="1371600" cy="2092881"/>
           </a:xfrm>
           <a:prstGeom prst="rect">
             <a:avLst/>
@@ -8105,18 +8137,18 @@
             <a:r>
               <a:rPr lang="en-US" sz="1300" dirty="0">
                 <a:solidFill>
-                  <a:schemeClr val="accent4"/>
+                  <a:srgbClr val="F8C302"/>
                 </a:solidFill>
                 <a:latin typeface="Calibri" panose="020F0502020204030204"/>
               </a:rPr>
-              <a:t>Sailboat Physics</a:t>
+              <a:t>Sailboat Simulation</a:t>
             </a:r>
             <a:endParaRPr kumimoji="0" lang="en-US" sz="1300" b="0" i="0" u="none" strike="noStrike" kern="1200" cap="none" spc="0" normalizeH="0" baseline="0" noProof="0" dirty="0">
               <a:ln>
                 <a:noFill/>
               </a:ln>
               <a:solidFill>
-                <a:schemeClr val="accent4"/>
+                <a:srgbClr val="F8C302"/>
               </a:solidFill>
               <a:effectLst/>
               <a:uLnTx/>
@@ -8470,6 +8502,446 @@
           <p:cNvPr id="2" name="Text Placeholder 1">
             <a:extLst>
               <a:ext uri="{FF2B5EF4-FFF2-40B4-BE49-F238E27FC236}">
+                <a16:creationId xmlns:a16="http://schemas.microsoft.com/office/drawing/2014/main" id="{99AC2C1C-BE46-4E55-BC09-95243CBA7D24}"/>
+              </a:ext>
+            </a:extLst>
+          </p:cNvPr>
+          <p:cNvSpPr>
+            <a:spLocks noGrp="1"/>
+          </p:cNvSpPr>
+          <p:nvPr>
+            <p:ph type="body" sz="quarter" idx="13"/>
+          </p:nvPr>
+        </p:nvSpPr>
+        <p:spPr/>
+        <p:txBody>
+          <a:bodyPr/>
+          <a:lstStyle/>
+          <a:p>
+            <a:r>
+              <a:rPr lang="en-GB" dirty="0"/>
+              <a:t>Sailboat Simulation</a:t>
+            </a:r>
+          </a:p>
+        </p:txBody>
+      </p:sp>
+      <p:sp>
+        <p:nvSpPr>
+          <p:cNvPr id="4" name="TextBox 3">
+            <a:extLst>
+              <a:ext uri="{FF2B5EF4-FFF2-40B4-BE49-F238E27FC236}">
+                <a16:creationId xmlns:a16="http://schemas.microsoft.com/office/drawing/2014/main" id="{6088B0E0-D5DB-F6D9-A1CF-6F9D7AA9002E}"/>
+              </a:ext>
+            </a:extLst>
+          </p:cNvPr>
+          <p:cNvSpPr txBox="1"/>
+          <p:nvPr/>
+        </p:nvSpPr>
+        <p:spPr>
+          <a:xfrm>
+            <a:off x="0" y="1375962"/>
+            <a:ext cx="1371600" cy="2092881"/>
+          </a:xfrm>
+          <a:prstGeom prst="rect">
+            <a:avLst/>
+          </a:prstGeom>
+          <a:noFill/>
+        </p:spPr>
+        <p:txBody>
+          <a:bodyPr wrap="square">
+            <a:spAutoFit/>
+          </a:bodyPr>
+          <a:lstStyle/>
+          <a:p>
+            <a:pPr marL="0" marR="0" lvl="0" indent="0" algn="l" defTabSz="457200" rtl="0" eaLnBrk="1" fontAlgn="auto" latinLnBrk="0" hangingPunct="1">
+              <a:lnSpc>
+                <a:spcPct val="100000"/>
+              </a:lnSpc>
+              <a:spcBef>
+                <a:spcPts val="0"/>
+              </a:spcBef>
+              <a:spcAft>
+                <a:spcPts val="0"/>
+              </a:spcAft>
+              <a:buClrTx/>
+              <a:buSzTx/>
+              <a:buFontTx/>
+              <a:buNone/>
+              <a:tabLst/>
+              <a:defRPr/>
+            </a:pPr>
+            <a:r>
+              <a:rPr kumimoji="0" lang="en-US" sz="1300" b="0" i="0" u="none" strike="noStrike" kern="1200" cap="none" spc="0" normalizeH="0" baseline="0" noProof="0" dirty="0">
+                <a:ln>
+                  <a:noFill/>
+                </a:ln>
+                <a:solidFill>
+                  <a:schemeClr val="bg1"/>
+                </a:solidFill>
+                <a:effectLst/>
+                <a:uLnTx/>
+                <a:uFillTx/>
+                <a:latin typeface="Calibri" panose="020F0502020204030204"/>
+                <a:ea typeface="+mn-ea"/>
+                <a:cs typeface="+mn-cs"/>
+              </a:rPr>
+              <a:t>Introduction</a:t>
+            </a:r>
+          </a:p>
+          <a:p>
+            <a:pPr marL="0" marR="0" lvl="0" indent="0" algn="l" defTabSz="457200" rtl="0" eaLnBrk="1" fontAlgn="auto" latinLnBrk="0" hangingPunct="1">
+              <a:lnSpc>
+                <a:spcPct val="100000"/>
+              </a:lnSpc>
+              <a:spcBef>
+                <a:spcPts val="0"/>
+              </a:spcBef>
+              <a:spcAft>
+                <a:spcPts val="0"/>
+              </a:spcAft>
+              <a:buClrTx/>
+              <a:buSzTx/>
+              <a:buFontTx/>
+              <a:buNone/>
+              <a:tabLst/>
+              <a:defRPr/>
+            </a:pPr>
+            <a:endParaRPr kumimoji="0" lang="en-US" sz="1300" b="0" i="0" u="none" strike="noStrike" kern="1200" cap="none" spc="0" normalizeH="0" baseline="0" noProof="0" dirty="0">
+              <a:ln>
+                <a:noFill/>
+              </a:ln>
+              <a:solidFill>
+                <a:prstClr val="white"/>
+              </a:solidFill>
+              <a:effectLst/>
+              <a:uLnTx/>
+              <a:uFillTx/>
+              <a:latin typeface="Calibri" panose="020F0502020204030204"/>
+              <a:ea typeface="+mn-ea"/>
+              <a:cs typeface="+mn-cs"/>
+            </a:endParaRPr>
+          </a:p>
+          <a:p>
+            <a:pPr marL="0" marR="0" lvl="0" indent="0" algn="l" defTabSz="457200" rtl="0" eaLnBrk="1" fontAlgn="auto" latinLnBrk="0" hangingPunct="1">
+              <a:lnSpc>
+                <a:spcPct val="100000"/>
+              </a:lnSpc>
+              <a:spcBef>
+                <a:spcPts val="0"/>
+              </a:spcBef>
+              <a:spcAft>
+                <a:spcPts val="0"/>
+              </a:spcAft>
+              <a:buClrTx/>
+              <a:buSzTx/>
+              <a:buFontTx/>
+              <a:buNone/>
+              <a:tabLst/>
+              <a:defRPr/>
+            </a:pPr>
+            <a:r>
+              <a:rPr lang="en-US" sz="1300" dirty="0">
+                <a:solidFill>
+                  <a:schemeClr val="bg1"/>
+                </a:solidFill>
+                <a:latin typeface="Calibri" panose="020F0502020204030204"/>
+              </a:rPr>
+              <a:t>Overview</a:t>
+            </a:r>
+            <a:endParaRPr kumimoji="0" lang="en-US" sz="1300" b="0" i="0" u="none" strike="noStrike" kern="1200" cap="none" spc="0" normalizeH="0" baseline="0" noProof="0" dirty="0">
+              <a:ln>
+                <a:noFill/>
+              </a:ln>
+              <a:solidFill>
+                <a:schemeClr val="bg1"/>
+              </a:solidFill>
+              <a:effectLst/>
+              <a:uLnTx/>
+              <a:uFillTx/>
+              <a:latin typeface="Calibri" panose="020F0502020204030204"/>
+              <a:ea typeface="+mn-ea"/>
+              <a:cs typeface="+mn-cs"/>
+            </a:endParaRPr>
+          </a:p>
+          <a:p>
+            <a:pPr marL="0" marR="0" lvl="0" indent="0" algn="l" defTabSz="457200" rtl="0" eaLnBrk="1" fontAlgn="auto" latinLnBrk="0" hangingPunct="1">
+              <a:lnSpc>
+                <a:spcPct val="100000"/>
+              </a:lnSpc>
+              <a:spcBef>
+                <a:spcPts val="0"/>
+              </a:spcBef>
+              <a:spcAft>
+                <a:spcPts val="0"/>
+              </a:spcAft>
+              <a:buClrTx/>
+              <a:buSzTx/>
+              <a:buFontTx/>
+              <a:buNone/>
+              <a:tabLst/>
+              <a:defRPr/>
+            </a:pPr>
+            <a:endParaRPr kumimoji="0" lang="en-US" sz="1300" b="0" i="0" u="none" strike="noStrike" kern="1200" cap="none" spc="0" normalizeH="0" baseline="0" noProof="0" dirty="0">
+              <a:ln>
+                <a:noFill/>
+              </a:ln>
+              <a:solidFill>
+                <a:prstClr val="white"/>
+              </a:solidFill>
+              <a:effectLst/>
+              <a:uLnTx/>
+              <a:uFillTx/>
+              <a:latin typeface="Calibri" panose="020F0502020204030204"/>
+              <a:ea typeface="+mn-ea"/>
+              <a:cs typeface="+mn-cs"/>
+            </a:endParaRPr>
+          </a:p>
+          <a:p>
+            <a:pPr marL="0" marR="0" lvl="0" indent="0" algn="l" defTabSz="457200" rtl="0" eaLnBrk="1" fontAlgn="auto" latinLnBrk="0" hangingPunct="1">
+              <a:lnSpc>
+                <a:spcPct val="100000"/>
+              </a:lnSpc>
+              <a:spcBef>
+                <a:spcPts val="0"/>
+              </a:spcBef>
+              <a:spcAft>
+                <a:spcPts val="0"/>
+              </a:spcAft>
+              <a:buClrTx/>
+              <a:buSzTx/>
+              <a:buFontTx/>
+              <a:buNone/>
+              <a:tabLst/>
+              <a:defRPr/>
+            </a:pPr>
+            <a:r>
+              <a:rPr lang="en-US" sz="1300" dirty="0">
+                <a:solidFill>
+                  <a:srgbClr val="F8C302"/>
+                </a:solidFill>
+                <a:latin typeface="Calibri" panose="020F0502020204030204"/>
+              </a:rPr>
+              <a:t>Sailboat Simulation</a:t>
+            </a:r>
+            <a:endParaRPr kumimoji="0" lang="en-US" sz="1300" b="0" i="0" u="none" strike="noStrike" kern="1200" cap="none" spc="0" normalizeH="0" baseline="0" noProof="0" dirty="0">
+              <a:ln>
+                <a:noFill/>
+              </a:ln>
+              <a:solidFill>
+                <a:srgbClr val="F8C302"/>
+              </a:solidFill>
+              <a:effectLst/>
+              <a:uLnTx/>
+              <a:uFillTx/>
+              <a:latin typeface="Calibri" panose="020F0502020204030204"/>
+              <a:ea typeface="+mn-ea"/>
+              <a:cs typeface="+mn-cs"/>
+            </a:endParaRPr>
+          </a:p>
+          <a:p>
+            <a:pPr marL="0" marR="0" lvl="0" indent="0" algn="l" defTabSz="457200" rtl="0" eaLnBrk="1" fontAlgn="auto" latinLnBrk="0" hangingPunct="1">
+              <a:lnSpc>
+                <a:spcPct val="100000"/>
+              </a:lnSpc>
+              <a:spcBef>
+                <a:spcPts val="0"/>
+              </a:spcBef>
+              <a:spcAft>
+                <a:spcPts val="0"/>
+              </a:spcAft>
+              <a:buClrTx/>
+              <a:buSzTx/>
+              <a:buFontTx/>
+              <a:buNone/>
+              <a:tabLst/>
+              <a:defRPr/>
+            </a:pPr>
+            <a:endParaRPr kumimoji="0" lang="en-US" sz="1300" b="0" i="0" u="none" strike="noStrike" kern="1200" cap="none" spc="0" normalizeH="0" baseline="0" noProof="0" dirty="0">
+              <a:ln>
+                <a:noFill/>
+              </a:ln>
+              <a:solidFill>
+                <a:prstClr val="white"/>
+              </a:solidFill>
+              <a:effectLst/>
+              <a:uLnTx/>
+              <a:uFillTx/>
+              <a:latin typeface="Calibri" panose="020F0502020204030204"/>
+              <a:ea typeface="+mn-ea"/>
+              <a:cs typeface="+mn-cs"/>
+            </a:endParaRPr>
+          </a:p>
+          <a:p>
+            <a:pPr marL="0" marR="0" lvl="0" indent="0" algn="l" defTabSz="457200" rtl="0" eaLnBrk="1" fontAlgn="auto" latinLnBrk="0" hangingPunct="1">
+              <a:lnSpc>
+                <a:spcPct val="100000"/>
+              </a:lnSpc>
+              <a:spcBef>
+                <a:spcPts val="0"/>
+              </a:spcBef>
+              <a:spcAft>
+                <a:spcPts val="0"/>
+              </a:spcAft>
+              <a:buClrTx/>
+              <a:buSzTx/>
+              <a:buFontTx/>
+              <a:buNone/>
+              <a:tabLst/>
+              <a:defRPr/>
+            </a:pPr>
+            <a:r>
+              <a:rPr kumimoji="0" lang="en-US" sz="1300" b="0" i="0" u="none" strike="noStrike" kern="1200" cap="none" spc="0" normalizeH="0" baseline="0" noProof="0" dirty="0">
+                <a:ln>
+                  <a:noFill/>
+                </a:ln>
+                <a:solidFill>
+                  <a:schemeClr val="bg1"/>
+                </a:solidFill>
+                <a:effectLst/>
+                <a:uLnTx/>
+                <a:uFillTx/>
+                <a:latin typeface="Calibri" panose="020F0502020204030204"/>
+                <a:ea typeface="+mn-ea"/>
+                <a:cs typeface="+mn-cs"/>
+              </a:rPr>
+              <a:t>Motion Control</a:t>
+            </a:r>
+          </a:p>
+          <a:p>
+            <a:pPr marL="0" marR="0" lvl="0" indent="0" algn="l" defTabSz="457200" rtl="0" eaLnBrk="1" fontAlgn="auto" latinLnBrk="0" hangingPunct="1">
+              <a:lnSpc>
+                <a:spcPct val="100000"/>
+              </a:lnSpc>
+              <a:spcBef>
+                <a:spcPts val="0"/>
+              </a:spcBef>
+              <a:spcAft>
+                <a:spcPts val="0"/>
+              </a:spcAft>
+              <a:buClrTx/>
+              <a:buSzTx/>
+              <a:buFontTx/>
+              <a:buNone/>
+              <a:tabLst/>
+              <a:defRPr/>
+            </a:pPr>
+            <a:endParaRPr kumimoji="0" lang="en-US" sz="1300" b="0" i="0" u="none" strike="noStrike" kern="1200" cap="none" spc="0" normalizeH="0" baseline="0" noProof="0" dirty="0">
+              <a:ln>
+                <a:noFill/>
+              </a:ln>
+              <a:solidFill>
+                <a:prstClr val="white"/>
+              </a:solidFill>
+              <a:effectLst/>
+              <a:uLnTx/>
+              <a:uFillTx/>
+              <a:latin typeface="Calibri" panose="020F0502020204030204"/>
+              <a:ea typeface="+mn-ea"/>
+              <a:cs typeface="+mn-cs"/>
+            </a:endParaRPr>
+          </a:p>
+          <a:p>
+            <a:pPr marL="0" marR="0" lvl="0" indent="0" algn="l" defTabSz="457200" rtl="0" eaLnBrk="1" fontAlgn="auto" latinLnBrk="0" hangingPunct="1">
+              <a:lnSpc>
+                <a:spcPct val="100000"/>
+              </a:lnSpc>
+              <a:spcBef>
+                <a:spcPts val="0"/>
+              </a:spcBef>
+              <a:spcAft>
+                <a:spcPts val="0"/>
+              </a:spcAft>
+              <a:buClrTx/>
+              <a:buSzTx/>
+              <a:buFontTx/>
+              <a:buNone/>
+              <a:tabLst/>
+              <a:defRPr/>
+            </a:pPr>
+            <a:r>
+              <a:rPr kumimoji="0" lang="en-US" sz="1300" b="0" i="0" u="none" strike="noStrike" kern="1200" cap="none" spc="0" normalizeH="0" baseline="0" noProof="0" dirty="0">
+                <a:ln>
+                  <a:noFill/>
+                </a:ln>
+                <a:solidFill>
+                  <a:prstClr val="white"/>
+                </a:solidFill>
+                <a:effectLst/>
+                <a:uLnTx/>
+                <a:uFillTx/>
+                <a:latin typeface="Calibri" panose="020F0502020204030204"/>
+                <a:ea typeface="+mn-ea"/>
+                <a:cs typeface="+mn-cs"/>
+              </a:rPr>
+              <a:t>Future Work</a:t>
+            </a:r>
+          </a:p>
+        </p:txBody>
+      </p:sp>
+      <p:pic>
+        <p:nvPicPr>
+          <p:cNvPr id="6" name="Picture 5" descr="A diagram of a sailboat simulator">
+            <a:extLst>
+              <a:ext uri="{FF2B5EF4-FFF2-40B4-BE49-F238E27FC236}">
+                <a16:creationId xmlns:a16="http://schemas.microsoft.com/office/drawing/2014/main" id="{3A3A7D88-597D-0733-1F2B-BB729660AEB6}"/>
+              </a:ext>
+            </a:extLst>
+          </p:cNvPr>
+          <p:cNvPicPr>
+            <a:picLocks noChangeAspect="1"/>
+          </p:cNvPicPr>
+          <p:nvPr/>
+        </p:nvPicPr>
+        <p:blipFill rotWithShape="1">
+          <a:blip r:embed="rId2"/>
+          <a:srcRect l="3867" r="3719"/>
+          <a:stretch/>
+        </p:blipFill>
+        <p:spPr>
+          <a:xfrm>
+            <a:off x="1489237" y="977154"/>
+            <a:ext cx="7589018" cy="4383740"/>
+          </a:xfrm>
+          <a:prstGeom prst="rect">
+            <a:avLst/>
+          </a:prstGeom>
+        </p:spPr>
+      </p:pic>
+    </p:spTree>
+    <p:extLst>
+      <p:ext uri="{BB962C8B-B14F-4D97-AF65-F5344CB8AC3E}">
+        <p14:creationId xmlns:p14="http://schemas.microsoft.com/office/powerpoint/2010/main" val="4259160155"/>
+      </p:ext>
+    </p:extLst>
+  </p:cSld>
+  <p:clrMapOvr>
+    <a:masterClrMapping/>
+  </p:clrMapOvr>
+</p:sld>
+</file>
+
+<file path=ppt/slides/slide19.xml><?xml version="1.0" encoding="utf-8"?>
+<p:sld xmlns:a="http://schemas.openxmlformats.org/drawingml/2006/main" xmlns:r="http://schemas.openxmlformats.org/officeDocument/2006/relationships" xmlns:p="http://schemas.openxmlformats.org/presentationml/2006/main">
+  <p:cSld>
+    <p:spTree>
+      <p:nvGrpSpPr>
+        <p:cNvPr id="1" name=""/>
+        <p:cNvGrpSpPr/>
+        <p:nvPr/>
+      </p:nvGrpSpPr>
+      <p:grpSpPr>
+        <a:xfrm>
+          <a:off x="0" y="0"/>
+          <a:ext cx="0" cy="0"/>
+          <a:chOff x="0" y="0"/>
+          <a:chExt cx="0" cy="0"/>
+        </a:xfrm>
+      </p:grpSpPr>
+      <p:sp>
+        <p:nvSpPr>
+          <p:cNvPr id="2" name="Text Placeholder 1">
+            <a:extLst>
+              <a:ext uri="{FF2B5EF4-FFF2-40B4-BE49-F238E27FC236}">
                 <a16:creationId xmlns:a16="http://schemas.microsoft.com/office/drawing/2014/main" id="{FCA4E67C-8241-C904-960E-E77CE7E8A405}"/>
               </a:ext>
             </a:extLst>
@@ -8538,7 +9010,7 @@
         <p:spPr>
           <a:xfrm>
             <a:off x="0" y="1375962"/>
-            <a:ext cx="1371600" cy="1892826"/>
+            <a:ext cx="1371600" cy="2092881"/>
           </a:xfrm>
           <a:prstGeom prst="rect">
             <a:avLst/>
@@ -8719,7 +9191,7 @@
                 </a:solidFill>
                 <a:latin typeface="Calibri" panose="020F0502020204030204"/>
               </a:rPr>
-              <a:t>Sailboat Physics</a:t>
+              <a:t>Sailboat Simulation</a:t>
             </a:r>
             <a:endParaRPr kumimoji="0" lang="en-US" sz="1300" b="0" i="0" u="none" strike="noStrike" kern="1200" cap="none" spc="0" normalizeH="0" baseline="0" noProof="0" dirty="0">
               <a:ln>
@@ -8889,7 +9361,151 @@
 </p:sld>
 </file>
 
-<file path=ppt/slides/slide19.xml><?xml version="1.0" encoding="utf-8"?>
+<file path=ppt/slides/slide2.xml><?xml version="1.0" encoding="utf-8"?>
+<p:sld xmlns:a="http://schemas.openxmlformats.org/drawingml/2006/main" xmlns:r="http://schemas.openxmlformats.org/officeDocument/2006/relationships" xmlns:p="http://schemas.openxmlformats.org/presentationml/2006/main">
+  <p:cSld>
+    <p:spTree>
+      <p:nvGrpSpPr>
+        <p:cNvPr id="1" name=""/>
+        <p:cNvGrpSpPr/>
+        <p:nvPr/>
+      </p:nvGrpSpPr>
+      <p:grpSpPr>
+        <a:xfrm>
+          <a:off x="0" y="0"/>
+          <a:ext cx="0" cy="0"/>
+          <a:chOff x="0" y="0"/>
+          <a:chExt cx="0" cy="0"/>
+        </a:xfrm>
+      </p:grpSpPr>
+      <p:sp>
+        <p:nvSpPr>
+          <p:cNvPr id="2" name="Text Placeholder 1">
+            <a:extLst>
+              <a:ext uri="{FF2B5EF4-FFF2-40B4-BE49-F238E27FC236}">
+                <a16:creationId xmlns:a16="http://schemas.microsoft.com/office/drawing/2014/main" id="{176B1C92-33EC-FFF6-32C2-39BFBE8A194D}"/>
+              </a:ext>
+            </a:extLst>
+          </p:cNvPr>
+          <p:cNvSpPr>
+            <a:spLocks noGrp="1"/>
+          </p:cNvSpPr>
+          <p:nvPr>
+            <p:ph type="body" sz="quarter" idx="13"/>
+          </p:nvPr>
+        </p:nvSpPr>
+        <p:spPr/>
+        <p:txBody>
+          <a:bodyPr/>
+          <a:lstStyle/>
+          <a:p>
+            <a:r>
+              <a:rPr lang="en-GB" dirty="0"/>
+              <a:t>Content</a:t>
+            </a:r>
+          </a:p>
+        </p:txBody>
+      </p:sp>
+      <p:sp>
+        <p:nvSpPr>
+          <p:cNvPr id="3" name="Text Placeholder 2">
+            <a:extLst>
+              <a:ext uri="{FF2B5EF4-FFF2-40B4-BE49-F238E27FC236}">
+                <a16:creationId xmlns:a16="http://schemas.microsoft.com/office/drawing/2014/main" id="{965A4CA4-99B7-82FF-1D39-A4CC54FBEE5E}"/>
+              </a:ext>
+            </a:extLst>
+          </p:cNvPr>
+          <p:cNvSpPr>
+            <a:spLocks noGrp="1"/>
+          </p:cNvSpPr>
+          <p:nvPr>
+            <p:ph type="body" sz="quarter" idx="14"/>
+          </p:nvPr>
+        </p:nvSpPr>
+        <p:spPr/>
+        <p:txBody>
+          <a:bodyPr/>
+          <a:lstStyle/>
+          <a:p>
+            <a:pPr marL="285750" indent="-285750">
+              <a:buFont typeface="Wingdings" panose="05000000000000000000" pitchFamily="2" charset="2"/>
+              <a:buChar char="q"/>
+            </a:pPr>
+            <a:r>
+              <a:rPr lang="en-GB" sz="3600" dirty="0"/>
+              <a:t>   Introduction</a:t>
+            </a:r>
+          </a:p>
+          <a:p>
+            <a:pPr marL="285750" indent="-285750">
+              <a:buFont typeface="Wingdings" panose="05000000000000000000" pitchFamily="2" charset="2"/>
+              <a:buChar char="q"/>
+            </a:pPr>
+            <a:r>
+              <a:rPr lang="en-GB" sz="3600" dirty="0"/>
+              <a:t>   Overview</a:t>
+            </a:r>
+          </a:p>
+          <a:p>
+            <a:pPr marL="285750" indent="-285750">
+              <a:buFont typeface="Wingdings" panose="05000000000000000000" pitchFamily="2" charset="2"/>
+              <a:buChar char="q"/>
+            </a:pPr>
+            <a:r>
+              <a:rPr lang="en-GB" sz="3600" dirty="0"/>
+              <a:t>   Sailboat Simulation</a:t>
+            </a:r>
+          </a:p>
+          <a:p>
+            <a:pPr marL="285750" indent="-285750">
+              <a:buFont typeface="Wingdings" panose="05000000000000000000" pitchFamily="2" charset="2"/>
+              <a:buChar char="q"/>
+            </a:pPr>
+            <a:r>
+              <a:rPr lang="en-GB" sz="3600" dirty="0"/>
+              <a:t>   Motion Control System</a:t>
+            </a:r>
+          </a:p>
+          <a:p>
+            <a:pPr marL="285750" indent="-285750">
+              <a:buFont typeface="Wingdings" panose="05000000000000000000" pitchFamily="2" charset="2"/>
+              <a:buChar char="q"/>
+            </a:pPr>
+            <a:r>
+              <a:rPr lang="en-GB" sz="3600" dirty="0"/>
+              <a:t>   Future Work</a:t>
+            </a:r>
+          </a:p>
+          <a:p>
+            <a:pPr marL="285750" indent="-285750">
+              <a:buFont typeface="Wingdings" panose="05000000000000000000" pitchFamily="2" charset="2"/>
+              <a:buChar char="q"/>
+            </a:pPr>
+            <a:endParaRPr lang="en-GB" dirty="0"/>
+          </a:p>
+          <a:p>
+            <a:pPr marL="285750" indent="-285750">
+              <a:buFont typeface="Wingdings" panose="05000000000000000000" pitchFamily="2" charset="2"/>
+              <a:buChar char="q"/>
+            </a:pPr>
+            <a:endParaRPr lang="en-GB" dirty="0"/>
+          </a:p>
+        </p:txBody>
+      </p:sp>
+    </p:spTree>
+    <p:extLst>
+      <p:ext uri="{BB962C8B-B14F-4D97-AF65-F5344CB8AC3E}">
+        <p14:creationId xmlns:p14="http://schemas.microsoft.com/office/powerpoint/2010/main" val="2395551810"/>
+      </p:ext>
+    </p:extLst>
+  </p:cSld>
+  <p:clrMapOvr>
+    <a:masterClrMapping/>
+  </p:clrMapOvr>
+</p:sld>
+</file>
+
+<file path=ppt/slides/slide20.xml><?xml version="1.0" encoding="utf-8"?>
 <p:sld xmlns:a="http://schemas.openxmlformats.org/drawingml/2006/main" xmlns:r="http://schemas.openxmlformats.org/officeDocument/2006/relationships" xmlns:p="http://schemas.openxmlformats.org/presentationml/2006/main">
   <p:cSld>
     <p:spTree>
@@ -8949,7 +9565,7 @@
         <p:spPr>
           <a:xfrm>
             <a:off x="0" y="1375962"/>
-            <a:ext cx="1371600" cy="1892826"/>
+            <a:ext cx="1371600" cy="2092881"/>
           </a:xfrm>
           <a:prstGeom prst="rect">
             <a:avLst/>
@@ -9130,7 +9746,7 @@
                 </a:solidFill>
                 <a:latin typeface="Calibri" panose="020F0502020204030204"/>
               </a:rPr>
-              <a:t>Sailboat Physics</a:t>
+              <a:t>Sailboat Simulation</a:t>
             </a:r>
             <a:endParaRPr kumimoji="0" lang="en-US" sz="1300" b="0" i="0" u="none" strike="noStrike" kern="1200" cap="none" spc="0" normalizeH="0" baseline="0" noProof="0" dirty="0">
               <a:ln>
@@ -9906,151 +10522,7 @@
 </p:sld>
 </file>
 
-<file path=ppt/slides/slide2.xml><?xml version="1.0" encoding="utf-8"?>
-<p:sld xmlns:a="http://schemas.openxmlformats.org/drawingml/2006/main" xmlns:r="http://schemas.openxmlformats.org/officeDocument/2006/relationships" xmlns:p="http://schemas.openxmlformats.org/presentationml/2006/main">
-  <p:cSld>
-    <p:spTree>
-      <p:nvGrpSpPr>
-        <p:cNvPr id="1" name=""/>
-        <p:cNvGrpSpPr/>
-        <p:nvPr/>
-      </p:nvGrpSpPr>
-      <p:grpSpPr>
-        <a:xfrm>
-          <a:off x="0" y="0"/>
-          <a:ext cx="0" cy="0"/>
-          <a:chOff x="0" y="0"/>
-          <a:chExt cx="0" cy="0"/>
-        </a:xfrm>
-      </p:grpSpPr>
-      <p:sp>
-        <p:nvSpPr>
-          <p:cNvPr id="2" name="Text Placeholder 1">
-            <a:extLst>
-              <a:ext uri="{FF2B5EF4-FFF2-40B4-BE49-F238E27FC236}">
-                <a16:creationId xmlns:a16="http://schemas.microsoft.com/office/drawing/2014/main" id="{176B1C92-33EC-FFF6-32C2-39BFBE8A194D}"/>
-              </a:ext>
-            </a:extLst>
-          </p:cNvPr>
-          <p:cNvSpPr>
-            <a:spLocks noGrp="1"/>
-          </p:cNvSpPr>
-          <p:nvPr>
-            <p:ph type="body" sz="quarter" idx="13"/>
-          </p:nvPr>
-        </p:nvSpPr>
-        <p:spPr/>
-        <p:txBody>
-          <a:bodyPr/>
-          <a:lstStyle/>
-          <a:p>
-            <a:r>
-              <a:rPr lang="en-GB" dirty="0"/>
-              <a:t>Content</a:t>
-            </a:r>
-          </a:p>
-        </p:txBody>
-      </p:sp>
-      <p:sp>
-        <p:nvSpPr>
-          <p:cNvPr id="3" name="Text Placeholder 2">
-            <a:extLst>
-              <a:ext uri="{FF2B5EF4-FFF2-40B4-BE49-F238E27FC236}">
-                <a16:creationId xmlns:a16="http://schemas.microsoft.com/office/drawing/2014/main" id="{965A4CA4-99B7-82FF-1D39-A4CC54FBEE5E}"/>
-              </a:ext>
-            </a:extLst>
-          </p:cNvPr>
-          <p:cNvSpPr>
-            <a:spLocks noGrp="1"/>
-          </p:cNvSpPr>
-          <p:nvPr>
-            <p:ph type="body" sz="quarter" idx="14"/>
-          </p:nvPr>
-        </p:nvSpPr>
-        <p:spPr/>
-        <p:txBody>
-          <a:bodyPr/>
-          <a:lstStyle/>
-          <a:p>
-            <a:pPr marL="285750" indent="-285750">
-              <a:buFont typeface="Wingdings" panose="05000000000000000000" pitchFamily="2" charset="2"/>
-              <a:buChar char="q"/>
-            </a:pPr>
-            <a:r>
-              <a:rPr lang="en-GB" sz="3600" dirty="0"/>
-              <a:t>   Introduction</a:t>
-            </a:r>
-          </a:p>
-          <a:p>
-            <a:pPr marL="285750" indent="-285750">
-              <a:buFont typeface="Wingdings" panose="05000000000000000000" pitchFamily="2" charset="2"/>
-              <a:buChar char="q"/>
-            </a:pPr>
-            <a:r>
-              <a:rPr lang="en-GB" sz="3600" dirty="0"/>
-              <a:t>   Overview</a:t>
-            </a:r>
-          </a:p>
-          <a:p>
-            <a:pPr marL="285750" indent="-285750">
-              <a:buFont typeface="Wingdings" panose="05000000000000000000" pitchFamily="2" charset="2"/>
-              <a:buChar char="q"/>
-            </a:pPr>
-            <a:r>
-              <a:rPr lang="en-GB" sz="3600" dirty="0"/>
-              <a:t>   Sailboat Physics</a:t>
-            </a:r>
-          </a:p>
-          <a:p>
-            <a:pPr marL="285750" indent="-285750">
-              <a:buFont typeface="Wingdings" panose="05000000000000000000" pitchFamily="2" charset="2"/>
-              <a:buChar char="q"/>
-            </a:pPr>
-            <a:r>
-              <a:rPr lang="en-GB" sz="3600" dirty="0"/>
-              <a:t>   Motion Control System</a:t>
-            </a:r>
-          </a:p>
-          <a:p>
-            <a:pPr marL="285750" indent="-285750">
-              <a:buFont typeface="Wingdings" panose="05000000000000000000" pitchFamily="2" charset="2"/>
-              <a:buChar char="q"/>
-            </a:pPr>
-            <a:r>
-              <a:rPr lang="en-GB" sz="3600" dirty="0"/>
-              <a:t>   Future Work</a:t>
-            </a:r>
-          </a:p>
-          <a:p>
-            <a:pPr marL="285750" indent="-285750">
-              <a:buFont typeface="Wingdings" panose="05000000000000000000" pitchFamily="2" charset="2"/>
-              <a:buChar char="q"/>
-            </a:pPr>
-            <a:endParaRPr lang="en-GB" dirty="0"/>
-          </a:p>
-          <a:p>
-            <a:pPr marL="285750" indent="-285750">
-              <a:buFont typeface="Wingdings" panose="05000000000000000000" pitchFamily="2" charset="2"/>
-              <a:buChar char="q"/>
-            </a:pPr>
-            <a:endParaRPr lang="en-GB" dirty="0"/>
-          </a:p>
-        </p:txBody>
-      </p:sp>
-    </p:spTree>
-    <p:extLst>
-      <p:ext uri="{BB962C8B-B14F-4D97-AF65-F5344CB8AC3E}">
-        <p14:creationId xmlns:p14="http://schemas.microsoft.com/office/powerpoint/2010/main" val="2395551810"/>
-      </p:ext>
-    </p:extLst>
-  </p:cSld>
-  <p:clrMapOvr>
-    <a:masterClrMapping/>
-  </p:clrMapOvr>
-</p:sld>
-</file>
-
-<file path=ppt/slides/slide20.xml><?xml version="1.0" encoding="utf-8"?>
+<file path=ppt/slides/slide21.xml><?xml version="1.0" encoding="utf-8"?>
 <p:sld xmlns:a="http://schemas.openxmlformats.org/drawingml/2006/main" xmlns:r="http://schemas.openxmlformats.org/officeDocument/2006/relationships" xmlns:p="http://schemas.openxmlformats.org/presentationml/2006/main">
   <p:cSld>
     <p:spTree>
@@ -10511,7 +10983,7 @@
         <p:spPr>
           <a:xfrm>
             <a:off x="0" y="1375962"/>
-            <a:ext cx="1371600" cy="1892826"/>
+            <a:ext cx="1371600" cy="2092881"/>
           </a:xfrm>
           <a:prstGeom prst="rect">
             <a:avLst/>
@@ -10692,7 +11164,7 @@
                 </a:solidFill>
                 <a:latin typeface="Calibri" panose="020F0502020204030204"/>
               </a:rPr>
-              <a:t>Sailboat Physics</a:t>
+              <a:t>Sailboat Simulation</a:t>
             </a:r>
             <a:endParaRPr kumimoji="0" lang="en-US" sz="1300" b="0" i="0" u="none" strike="noStrike" kern="1200" cap="none" spc="0" normalizeH="0" baseline="0" noProof="0" dirty="0">
               <a:ln>
@@ -10862,7 +11334,7 @@
 </p:sld>
 </file>
 
-<file path=ppt/slides/slide21.xml><?xml version="1.0" encoding="utf-8"?>
+<file path=ppt/slides/slide22.xml><?xml version="1.0" encoding="utf-8"?>
 <p:sld xmlns:a="http://schemas.openxmlformats.org/drawingml/2006/main" xmlns:r="http://schemas.openxmlformats.org/officeDocument/2006/relationships" xmlns:p="http://schemas.openxmlformats.org/presentationml/2006/main">
   <p:cSld>
     <p:spTree>
@@ -10969,7 +11441,7 @@
         <p:spPr>
           <a:xfrm>
             <a:off x="0" y="1375962"/>
-            <a:ext cx="1371600" cy="1892826"/>
+            <a:ext cx="1371600" cy="2092881"/>
           </a:xfrm>
           <a:prstGeom prst="rect">
             <a:avLst/>
@@ -11150,7 +11622,7 @@
                 </a:solidFill>
                 <a:latin typeface="Calibri" panose="020F0502020204030204"/>
               </a:rPr>
-              <a:t>Sailboat Physics</a:t>
+              <a:t>Sailboat Simulation</a:t>
             </a:r>
             <a:endParaRPr kumimoji="0" lang="en-US" sz="1300" b="0" i="0" u="none" strike="noStrike" kern="1200" cap="none" spc="0" normalizeH="0" baseline="0" noProof="0" dirty="0">
               <a:ln>
@@ -11350,7 +11822,7 @@
 </p:sld>
 </file>
 
-<file path=ppt/slides/slide22.xml><?xml version="1.0" encoding="utf-8"?>
+<file path=ppt/slides/slide23.xml><?xml version="1.0" encoding="utf-8"?>
 <p:sld xmlns:a="http://schemas.openxmlformats.org/drawingml/2006/main" xmlns:r="http://schemas.openxmlformats.org/officeDocument/2006/relationships" xmlns:p="http://schemas.openxmlformats.org/presentationml/2006/main">
   <p:cSld>
     <p:spTree>
@@ -11410,7 +11882,7 @@
         <p:spPr>
           <a:xfrm>
             <a:off x="0" y="1375962"/>
-            <a:ext cx="1371600" cy="1892826"/>
+            <a:ext cx="1371600" cy="2092881"/>
           </a:xfrm>
           <a:prstGeom prst="rect">
             <a:avLst/>
@@ -11591,7 +12063,7 @@
                 </a:solidFill>
                 <a:latin typeface="Calibri" panose="020F0502020204030204"/>
               </a:rPr>
-              <a:t>Sailboat Physics</a:t>
+              <a:t>Sailboat Simulation</a:t>
             </a:r>
             <a:endParaRPr kumimoji="0" lang="en-US" sz="1300" b="0" i="0" u="none" strike="noStrike" kern="1200" cap="none" spc="0" normalizeH="0" baseline="0" noProof="0" dirty="0">
               <a:ln>
@@ -11821,7 +12293,7 @@
 </p:sld>
 </file>
 
-<file path=ppt/slides/slide23.xml><?xml version="1.0" encoding="utf-8"?>
+<file path=ppt/slides/slide24.xml><?xml version="1.0" encoding="utf-8"?>
 <p:sld xmlns:a="http://schemas.openxmlformats.org/drawingml/2006/main" xmlns:r="http://schemas.openxmlformats.org/officeDocument/2006/relationships" xmlns:p="http://schemas.openxmlformats.org/presentationml/2006/main">
   <p:cSld>
     <p:spTree>
@@ -11866,8 +12338,8 @@
           </a:p>
         </p:txBody>
       </p:sp>
-      <mc:AlternateContent xmlns:mc="http://schemas.openxmlformats.org/markup-compatibility/2006" xmlns:a14="http://schemas.microsoft.com/office/drawing/2010/main">
-        <mc:Choice Requires="a14">
+      <mc:AlternateContent xmlns:mc="http://schemas.openxmlformats.org/markup-compatibility/2006">
+        <mc:Choice xmlns:a14="http://schemas.microsoft.com/office/drawing/2010/main" Requires="a14">
           <p:sp>
             <p:nvSpPr>
               <p:cNvPr id="3" name="Text Placeholder 2">
@@ -12292,6 +12764,12 @@
                       <a:rPr lang="en-GB" sz="2000" b="0" i="1" smtClean="0">
                         <a:latin typeface="Cambria Math" panose="02040503050406030204" pitchFamily="18" charset="0"/>
                       </a:rPr>
+                      <m:t>−</m:t>
+                    </m:r>
+                    <m:r>
+                      <a:rPr lang="en-GB" sz="2000" b="0" i="1" smtClean="0">
+                        <a:latin typeface="Cambria Math" panose="02040503050406030204" pitchFamily="18" charset="0"/>
+                      </a:rPr>
                       <m:t>0.5 ∗ </m:t>
                     </m:r>
                     <m:sSub>
@@ -12335,7 +12813,7 @@
                 </a:r>
                 <a:r>
                   <a:rPr lang="en-GB" sz="2000" dirty="0"/>
-                  <a:t>					 ( -180 &lt; </a:t>
+                  <a:t>				( -180 &lt; </a:t>
                 </a:r>
                 <a14:m>
                   <m:oMath xmlns:m="http://schemas.openxmlformats.org/officeDocument/2006/math">
@@ -12414,7 +12892,7 @@
             </p:txBody>
           </p:sp>
         </mc:Choice>
-        <mc:Fallback xmlns="">
+        <mc:Fallback>
           <p:sp>
             <p:nvSpPr>
               <p:cNvPr id="3" name="Text Placeholder 2">
@@ -12498,7 +12976,7 @@
         <p:spPr>
           <a:xfrm>
             <a:off x="0" y="1375962"/>
-            <a:ext cx="1371600" cy="1892826"/>
+            <a:ext cx="1371600" cy="2092881"/>
           </a:xfrm>
           <a:prstGeom prst="rect">
             <a:avLst/>
@@ -12679,7 +13157,7 @@
                 </a:solidFill>
                 <a:latin typeface="Calibri" panose="020F0502020204030204"/>
               </a:rPr>
-              <a:t>Sailboat Physics</a:t>
+              <a:t>Sailboat Simulation</a:t>
             </a:r>
             <a:endParaRPr kumimoji="0" lang="en-US" sz="1300" b="0" i="0" u="none" strike="noStrike" kern="1200" cap="none" spc="0" normalizeH="0" baseline="0" noProof="0" dirty="0">
               <a:ln>
@@ -12849,7 +13327,7 @@
 </p:sld>
 </file>
 
-<file path=ppt/slides/slide24.xml><?xml version="1.0" encoding="utf-8"?>
+<file path=ppt/slides/slide25.xml><?xml version="1.0" encoding="utf-8"?>
 <p:sld xmlns:a="http://schemas.openxmlformats.org/drawingml/2006/main" xmlns:r="http://schemas.openxmlformats.org/officeDocument/2006/relationships" xmlns:p="http://schemas.openxmlformats.org/presentationml/2006/main">
   <p:cSld>
     <p:spTree>
@@ -13320,7 +13798,7 @@
 </p:sld>
 </file>
 
-<file path=ppt/slides/slide25.xml><?xml version="1.0" encoding="utf-8"?>
+<file path=ppt/slides/slide26.xml><?xml version="1.0" encoding="utf-8"?>
 <p:sld xmlns:a="http://schemas.openxmlformats.org/drawingml/2006/main" xmlns:r="http://schemas.openxmlformats.org/officeDocument/2006/relationships" xmlns:p="http://schemas.openxmlformats.org/presentationml/2006/main">
   <p:cSld>
     <p:spTree>
@@ -13359,10 +13837,9 @@
           <a:lstStyle/>
           <a:p>
             <a:r>
-              <a:rPr lang="en-GB"/>
-              <a:t>Motion Control: Tacking</a:t>
-            </a:r>
-            <a:endParaRPr lang="en-GB" dirty="0"/>
+              <a:rPr lang="en-GB" dirty="0"/>
+              <a:t>Motion Control: Tacking Controller</a:t>
+            </a:r>
           </a:p>
         </p:txBody>
       </p:sp>
@@ -13528,7 +14005,7 @@
         <p:spPr>
           <a:xfrm>
             <a:off x="0" y="1375962"/>
-            <a:ext cx="1371600" cy="1892826"/>
+            <a:ext cx="1371600" cy="2092881"/>
           </a:xfrm>
           <a:prstGeom prst="rect">
             <a:avLst/>
@@ -13709,7 +14186,7 @@
                 </a:solidFill>
                 <a:latin typeface="Calibri" panose="020F0502020204030204"/>
               </a:rPr>
-              <a:t>Sailboat Physics</a:t>
+              <a:t>Sailboat Simulation</a:t>
             </a:r>
             <a:endParaRPr kumimoji="0" lang="en-US" sz="1300" b="0" i="0" u="none" strike="noStrike" kern="1200" cap="none" spc="0" normalizeH="0" baseline="0" noProof="0" dirty="0">
               <a:ln>
@@ -13879,7 +14356,7 @@
 </p:sld>
 </file>
 
-<file path=ppt/slides/slide26.xml><?xml version="1.0" encoding="utf-8"?>
+<file path=ppt/slides/slide27.xml><?xml version="1.0" encoding="utf-8"?>
 <p:sld xmlns:a="http://schemas.openxmlformats.org/drawingml/2006/main" xmlns:r="http://schemas.openxmlformats.org/officeDocument/2006/relationships" xmlns:p="http://schemas.openxmlformats.org/presentationml/2006/main">
   <p:cSld>
     <p:spTree>
@@ -13956,12 +14433,365 @@
           </a:p>
         </p:txBody>
       </p:sp>
+      <p:sp>
+        <p:nvSpPr>
+          <p:cNvPr id="4" name="TextBox 3">
+            <a:extLst>
+              <a:ext uri="{FF2B5EF4-FFF2-40B4-BE49-F238E27FC236}">
+                <a16:creationId xmlns:a16="http://schemas.microsoft.com/office/drawing/2014/main" id="{D3A95BFD-6D74-8948-BA7D-C993832DF5AF}"/>
+              </a:ext>
+            </a:extLst>
+          </p:cNvPr>
+          <p:cNvSpPr txBox="1"/>
+          <p:nvPr/>
+        </p:nvSpPr>
+        <p:spPr>
+          <a:xfrm>
+            <a:off x="0" y="1375962"/>
+            <a:ext cx="1371600" cy="2092881"/>
+          </a:xfrm>
+          <a:prstGeom prst="rect">
+            <a:avLst/>
+          </a:prstGeom>
+          <a:noFill/>
+        </p:spPr>
+        <p:txBody>
+          <a:bodyPr wrap="square">
+            <a:spAutoFit/>
+          </a:bodyPr>
+          <a:lstStyle/>
+          <a:p>
+            <a:pPr marL="0" marR="0" lvl="0" indent="0" algn="l" defTabSz="457200" rtl="0" eaLnBrk="1" fontAlgn="auto" latinLnBrk="0" hangingPunct="1">
+              <a:lnSpc>
+                <a:spcPct val="100000"/>
+              </a:lnSpc>
+              <a:spcBef>
+                <a:spcPts val="0"/>
+              </a:spcBef>
+              <a:spcAft>
+                <a:spcPts val="0"/>
+              </a:spcAft>
+              <a:buClrTx/>
+              <a:buSzTx/>
+              <a:buFontTx/>
+              <a:buNone/>
+              <a:tabLst/>
+              <a:defRPr/>
+            </a:pPr>
+            <a:r>
+              <a:rPr kumimoji="0" lang="en-US" sz="1300" b="0" i="0" u="none" strike="noStrike" kern="1200" cap="none" spc="0" normalizeH="0" baseline="0" noProof="0" dirty="0">
+                <a:ln>
+                  <a:noFill/>
+                </a:ln>
+                <a:solidFill>
+                  <a:schemeClr val="bg1"/>
+                </a:solidFill>
+                <a:effectLst/>
+                <a:uLnTx/>
+                <a:uFillTx/>
+                <a:latin typeface="Calibri" panose="020F0502020204030204"/>
+                <a:ea typeface="+mn-ea"/>
+                <a:cs typeface="+mn-cs"/>
+              </a:rPr>
+              <a:t>Introduction</a:t>
+            </a:r>
+          </a:p>
+          <a:p>
+            <a:pPr marL="0" marR="0" lvl="0" indent="0" algn="l" defTabSz="457200" rtl="0" eaLnBrk="1" fontAlgn="auto" latinLnBrk="0" hangingPunct="1">
+              <a:lnSpc>
+                <a:spcPct val="100000"/>
+              </a:lnSpc>
+              <a:spcBef>
+                <a:spcPts val="0"/>
+              </a:spcBef>
+              <a:spcAft>
+                <a:spcPts val="0"/>
+              </a:spcAft>
+              <a:buClrTx/>
+              <a:buSzTx/>
+              <a:buFontTx/>
+              <a:buNone/>
+              <a:tabLst/>
+              <a:defRPr/>
+            </a:pPr>
+            <a:endParaRPr kumimoji="0" lang="en-US" sz="1300" b="0" i="0" u="none" strike="noStrike" kern="1200" cap="none" spc="0" normalizeH="0" baseline="0" noProof="0" dirty="0">
+              <a:ln>
+                <a:noFill/>
+              </a:ln>
+              <a:solidFill>
+                <a:prstClr val="white"/>
+              </a:solidFill>
+              <a:effectLst/>
+              <a:uLnTx/>
+              <a:uFillTx/>
+              <a:latin typeface="Calibri" panose="020F0502020204030204"/>
+              <a:ea typeface="+mn-ea"/>
+              <a:cs typeface="+mn-cs"/>
+            </a:endParaRPr>
+          </a:p>
+          <a:p>
+            <a:pPr marL="0" marR="0" lvl="0" indent="0" algn="l" defTabSz="457200" rtl="0" eaLnBrk="1" fontAlgn="auto" latinLnBrk="0" hangingPunct="1">
+              <a:lnSpc>
+                <a:spcPct val="100000"/>
+              </a:lnSpc>
+              <a:spcBef>
+                <a:spcPts val="0"/>
+              </a:spcBef>
+              <a:spcAft>
+                <a:spcPts val="0"/>
+              </a:spcAft>
+              <a:buClrTx/>
+              <a:buSzTx/>
+              <a:buFontTx/>
+              <a:buNone/>
+              <a:tabLst/>
+              <a:defRPr/>
+            </a:pPr>
+            <a:r>
+              <a:rPr lang="en-US" sz="1300" dirty="0">
+                <a:solidFill>
+                  <a:schemeClr val="bg1"/>
+                </a:solidFill>
+                <a:latin typeface="Calibri" panose="020F0502020204030204"/>
+              </a:rPr>
+              <a:t>Overview</a:t>
+            </a:r>
+            <a:endParaRPr kumimoji="0" lang="en-US" sz="1300" b="0" i="0" u="none" strike="noStrike" kern="1200" cap="none" spc="0" normalizeH="0" baseline="0" noProof="0" dirty="0">
+              <a:ln>
+                <a:noFill/>
+              </a:ln>
+              <a:solidFill>
+                <a:schemeClr val="bg1"/>
+              </a:solidFill>
+              <a:effectLst/>
+              <a:uLnTx/>
+              <a:uFillTx/>
+              <a:latin typeface="Calibri" panose="020F0502020204030204"/>
+              <a:ea typeface="+mn-ea"/>
+              <a:cs typeface="+mn-cs"/>
+            </a:endParaRPr>
+          </a:p>
+          <a:p>
+            <a:pPr marL="0" marR="0" lvl="0" indent="0" algn="l" defTabSz="457200" rtl="0" eaLnBrk="1" fontAlgn="auto" latinLnBrk="0" hangingPunct="1">
+              <a:lnSpc>
+                <a:spcPct val="100000"/>
+              </a:lnSpc>
+              <a:spcBef>
+                <a:spcPts val="0"/>
+              </a:spcBef>
+              <a:spcAft>
+                <a:spcPts val="0"/>
+              </a:spcAft>
+              <a:buClrTx/>
+              <a:buSzTx/>
+              <a:buFontTx/>
+              <a:buNone/>
+              <a:tabLst/>
+              <a:defRPr/>
+            </a:pPr>
+            <a:endParaRPr kumimoji="0" lang="en-US" sz="1300" b="0" i="0" u="none" strike="noStrike" kern="1200" cap="none" spc="0" normalizeH="0" baseline="0" noProof="0" dirty="0">
+              <a:ln>
+                <a:noFill/>
+              </a:ln>
+              <a:solidFill>
+                <a:prstClr val="white"/>
+              </a:solidFill>
+              <a:effectLst/>
+              <a:uLnTx/>
+              <a:uFillTx/>
+              <a:latin typeface="Calibri" panose="020F0502020204030204"/>
+              <a:ea typeface="+mn-ea"/>
+              <a:cs typeface="+mn-cs"/>
+            </a:endParaRPr>
+          </a:p>
+          <a:p>
+            <a:pPr marL="0" marR="0" lvl="0" indent="0" algn="l" defTabSz="457200" rtl="0" eaLnBrk="1" fontAlgn="auto" latinLnBrk="0" hangingPunct="1">
+              <a:lnSpc>
+                <a:spcPct val="100000"/>
+              </a:lnSpc>
+              <a:spcBef>
+                <a:spcPts val="0"/>
+              </a:spcBef>
+              <a:spcAft>
+                <a:spcPts val="0"/>
+              </a:spcAft>
+              <a:buClrTx/>
+              <a:buSzTx/>
+              <a:buFontTx/>
+              <a:buNone/>
+              <a:tabLst/>
+              <a:defRPr/>
+            </a:pPr>
+            <a:r>
+              <a:rPr lang="en-US" sz="1300" dirty="0">
+                <a:solidFill>
+                  <a:schemeClr val="bg1"/>
+                </a:solidFill>
+                <a:latin typeface="Calibri" panose="020F0502020204030204"/>
+              </a:rPr>
+              <a:t>Sailboat Simulation</a:t>
+            </a:r>
+            <a:endParaRPr kumimoji="0" lang="en-US" sz="1300" b="0" i="0" u="none" strike="noStrike" kern="1200" cap="none" spc="0" normalizeH="0" baseline="0" noProof="0" dirty="0">
+              <a:ln>
+                <a:noFill/>
+              </a:ln>
+              <a:solidFill>
+                <a:schemeClr val="bg1"/>
+              </a:solidFill>
+              <a:effectLst/>
+              <a:uLnTx/>
+              <a:uFillTx/>
+              <a:latin typeface="Calibri" panose="020F0502020204030204"/>
+              <a:ea typeface="+mn-ea"/>
+              <a:cs typeface="+mn-cs"/>
+            </a:endParaRPr>
+          </a:p>
+          <a:p>
+            <a:pPr marL="0" marR="0" lvl="0" indent="0" algn="l" defTabSz="457200" rtl="0" eaLnBrk="1" fontAlgn="auto" latinLnBrk="0" hangingPunct="1">
+              <a:lnSpc>
+                <a:spcPct val="100000"/>
+              </a:lnSpc>
+              <a:spcBef>
+                <a:spcPts val="0"/>
+              </a:spcBef>
+              <a:spcAft>
+                <a:spcPts val="0"/>
+              </a:spcAft>
+              <a:buClrTx/>
+              <a:buSzTx/>
+              <a:buFontTx/>
+              <a:buNone/>
+              <a:tabLst/>
+              <a:defRPr/>
+            </a:pPr>
+            <a:endParaRPr kumimoji="0" lang="en-US" sz="1300" b="0" i="0" u="none" strike="noStrike" kern="1200" cap="none" spc="0" normalizeH="0" baseline="0" noProof="0" dirty="0">
+              <a:ln>
+                <a:noFill/>
+              </a:ln>
+              <a:solidFill>
+                <a:prstClr val="white"/>
+              </a:solidFill>
+              <a:effectLst/>
+              <a:uLnTx/>
+              <a:uFillTx/>
+              <a:latin typeface="Calibri" panose="020F0502020204030204"/>
+              <a:ea typeface="+mn-ea"/>
+              <a:cs typeface="+mn-cs"/>
+            </a:endParaRPr>
+          </a:p>
+          <a:p>
+            <a:pPr marL="0" marR="0" lvl="0" indent="0" algn="l" defTabSz="457200" rtl="0" eaLnBrk="1" fontAlgn="auto" latinLnBrk="0" hangingPunct="1">
+              <a:lnSpc>
+                <a:spcPct val="100000"/>
+              </a:lnSpc>
+              <a:spcBef>
+                <a:spcPts val="0"/>
+              </a:spcBef>
+              <a:spcAft>
+                <a:spcPts val="0"/>
+              </a:spcAft>
+              <a:buClrTx/>
+              <a:buSzTx/>
+              <a:buFontTx/>
+              <a:buNone/>
+              <a:tabLst/>
+              <a:defRPr/>
+            </a:pPr>
+            <a:r>
+              <a:rPr kumimoji="0" lang="en-US" sz="1300" b="0" i="0" u="none" strike="noStrike" kern="1200" cap="none" spc="0" normalizeH="0" baseline="0" noProof="0" dirty="0">
+                <a:ln>
+                  <a:noFill/>
+                </a:ln>
+                <a:solidFill>
+                  <a:schemeClr val="accent4"/>
+                </a:solidFill>
+                <a:effectLst/>
+                <a:uLnTx/>
+                <a:uFillTx/>
+                <a:latin typeface="Calibri" panose="020F0502020204030204"/>
+                <a:ea typeface="+mn-ea"/>
+                <a:cs typeface="+mn-cs"/>
+              </a:rPr>
+              <a:t>Motion Control</a:t>
+            </a:r>
+          </a:p>
+          <a:p>
+            <a:pPr marL="0" marR="0" lvl="0" indent="0" algn="l" defTabSz="457200" rtl="0" eaLnBrk="1" fontAlgn="auto" latinLnBrk="0" hangingPunct="1">
+              <a:lnSpc>
+                <a:spcPct val="100000"/>
+              </a:lnSpc>
+              <a:spcBef>
+                <a:spcPts val="0"/>
+              </a:spcBef>
+              <a:spcAft>
+                <a:spcPts val="0"/>
+              </a:spcAft>
+              <a:buClrTx/>
+              <a:buSzTx/>
+              <a:buFontTx/>
+              <a:buNone/>
+              <a:tabLst/>
+              <a:defRPr/>
+            </a:pPr>
+            <a:endParaRPr kumimoji="0" lang="en-US" sz="1300" b="0" i="0" u="none" strike="noStrike" kern="1200" cap="none" spc="0" normalizeH="0" baseline="0" noProof="0" dirty="0">
+              <a:ln>
+                <a:noFill/>
+              </a:ln>
+              <a:solidFill>
+                <a:prstClr val="white"/>
+              </a:solidFill>
+              <a:effectLst/>
+              <a:uLnTx/>
+              <a:uFillTx/>
+              <a:latin typeface="Calibri" panose="020F0502020204030204"/>
+              <a:ea typeface="+mn-ea"/>
+              <a:cs typeface="+mn-cs"/>
+            </a:endParaRPr>
+          </a:p>
+          <a:p>
+            <a:pPr marL="0" marR="0" lvl="0" indent="0" algn="l" defTabSz="457200" rtl="0" eaLnBrk="1" fontAlgn="auto" latinLnBrk="0" hangingPunct="1">
+              <a:lnSpc>
+                <a:spcPct val="100000"/>
+              </a:lnSpc>
+              <a:spcBef>
+                <a:spcPts val="0"/>
+              </a:spcBef>
+              <a:spcAft>
+                <a:spcPts val="0"/>
+              </a:spcAft>
+              <a:buClrTx/>
+              <a:buSzTx/>
+              <a:buFontTx/>
+              <a:buNone/>
+              <a:tabLst/>
+              <a:defRPr/>
+            </a:pPr>
+            <a:r>
+              <a:rPr kumimoji="0" lang="en-US" sz="1300" b="0" i="0" u="none" strike="noStrike" kern="1200" cap="none" spc="0" normalizeH="0" baseline="0" noProof="0" dirty="0">
+                <a:ln>
+                  <a:noFill/>
+                </a:ln>
+                <a:solidFill>
+                  <a:prstClr val="white"/>
+                </a:solidFill>
+                <a:effectLst/>
+                <a:uLnTx/>
+                <a:uFillTx/>
+                <a:latin typeface="Calibri" panose="020F0502020204030204"/>
+                <a:ea typeface="+mn-ea"/>
+                <a:cs typeface="+mn-cs"/>
+              </a:rPr>
+              <a:t>Future Work</a:t>
+            </a:r>
+          </a:p>
+        </p:txBody>
+      </p:sp>
       <p:pic>
         <p:nvPicPr>
-          <p:cNvPr id="7" name="Picture 6" descr="A line with lines and numbers&#10;&#10;Description automatically generated">
+          <p:cNvPr id="6" name="Picture 5" descr="A green line in a black background&#10;&#10;Description automatically generated">
             <a:extLst>
               <a:ext uri="{FF2B5EF4-FFF2-40B4-BE49-F238E27FC236}">
-                <a16:creationId xmlns:a16="http://schemas.microsoft.com/office/drawing/2014/main" id="{B2A27EA5-A34A-B64B-9FBF-F54F81C2079E}"/>
+                <a16:creationId xmlns:a16="http://schemas.microsoft.com/office/drawing/2014/main" id="{DA58AD5A-C309-CCD5-5B20-07481C4C754F}"/>
               </a:ext>
             </a:extLst>
           </p:cNvPr>
@@ -13978,20 +14808,78 @@
         </p:blipFill>
         <p:spPr>
           <a:xfrm>
-            <a:off x="1872094" y="1872607"/>
-            <a:ext cx="6924509" cy="2072003"/>
+            <a:off x="1657508" y="3020587"/>
+            <a:ext cx="7353682" cy="1777614"/>
           </a:xfrm>
           <a:prstGeom prst="rect">
             <a:avLst/>
           </a:prstGeom>
         </p:spPr>
       </p:pic>
+    </p:spTree>
+    <p:extLst>
+      <p:ext uri="{BB962C8B-B14F-4D97-AF65-F5344CB8AC3E}">
+        <p14:creationId xmlns:p14="http://schemas.microsoft.com/office/powerpoint/2010/main" val="2897117262"/>
+      </p:ext>
+    </p:extLst>
+  </p:cSld>
+  <p:clrMapOvr>
+    <a:masterClrMapping/>
+  </p:clrMapOvr>
+</p:sld>
+</file>
+
+<file path=ppt/slides/slide28.xml><?xml version="1.0" encoding="utf-8"?>
+<p:sld xmlns:a="http://schemas.openxmlformats.org/drawingml/2006/main" xmlns:r="http://schemas.openxmlformats.org/officeDocument/2006/relationships" xmlns:p="http://schemas.openxmlformats.org/presentationml/2006/main">
+  <p:cSld>
+    <p:spTree>
+      <p:nvGrpSpPr>
+        <p:cNvPr id="1" name=""/>
+        <p:cNvGrpSpPr/>
+        <p:nvPr/>
+      </p:nvGrpSpPr>
+      <p:grpSpPr>
+        <a:xfrm>
+          <a:off x="0" y="0"/>
+          <a:ext cx="0" cy="0"/>
+          <a:chOff x="0" y="0"/>
+          <a:chExt cx="0" cy="0"/>
+        </a:xfrm>
+      </p:grpSpPr>
+      <p:sp>
+        <p:nvSpPr>
+          <p:cNvPr id="2" name="Text Placeholder 1">
+            <a:extLst>
+              <a:ext uri="{FF2B5EF4-FFF2-40B4-BE49-F238E27FC236}">
+                <a16:creationId xmlns:a16="http://schemas.microsoft.com/office/drawing/2014/main" id="{C2E6318D-C07D-69BF-25F7-096D172466BA}"/>
+              </a:ext>
+            </a:extLst>
+          </p:cNvPr>
+          <p:cNvSpPr>
+            <a:spLocks noGrp="1"/>
+          </p:cNvSpPr>
+          <p:nvPr>
+            <p:ph type="body" sz="quarter" idx="13"/>
+          </p:nvPr>
+        </p:nvSpPr>
+        <p:spPr/>
+        <p:txBody>
+          <a:bodyPr/>
+          <a:lstStyle/>
+          <a:p>
+            <a:r>
+              <a:rPr lang="en-GB" dirty="0"/>
+              <a:t>Motion Control: Direct Tack </a:t>
+            </a:r>
+          </a:p>
+        </p:txBody>
+      </p:sp>
       <p:sp>
         <p:nvSpPr>
           <p:cNvPr id="4" name="TextBox 3">
             <a:extLst>
               <a:ext uri="{FF2B5EF4-FFF2-40B4-BE49-F238E27FC236}">
-                <a16:creationId xmlns:a16="http://schemas.microsoft.com/office/drawing/2014/main" id="{D3A95BFD-6D74-8948-BA7D-C993832DF5AF}"/>
+                <a16:creationId xmlns:a16="http://schemas.microsoft.com/office/drawing/2014/main" id="{00E5BF15-A4DC-319A-3386-04105F861681}"/>
               </a:ext>
             </a:extLst>
           </p:cNvPr>
@@ -14001,7 +14889,7 @@
         <p:spPr>
           <a:xfrm>
             <a:off x="0" y="1375962"/>
-            <a:ext cx="1371600" cy="1892826"/>
+            <a:ext cx="1371600" cy="2092881"/>
           </a:xfrm>
           <a:prstGeom prst="rect">
             <a:avLst/>
@@ -14182,7 +15070,7 @@
                 </a:solidFill>
                 <a:latin typeface="Calibri" panose="020F0502020204030204"/>
               </a:rPr>
-              <a:t>Sailboat Physics</a:t>
+              <a:t>Sailboat Simulation</a:t>
             </a:r>
             <a:endParaRPr kumimoji="0" lang="en-US" sz="1300" b="0" i="0" u="none" strike="noStrike" kern="1200" cap="none" spc="0" normalizeH="0" baseline="0" noProof="0" dirty="0">
               <a:ln>
@@ -14339,10 +15227,68 @@
           </a:p>
         </p:txBody>
       </p:sp>
+      <p:pic>
+        <p:nvPicPr>
+          <p:cNvPr id="11" name="Picture 10" descr="A graph with a red line&#10;&#10;Description automatically generated">
+            <a:extLst>
+              <a:ext uri="{FF2B5EF4-FFF2-40B4-BE49-F238E27FC236}">
+                <a16:creationId xmlns:a16="http://schemas.microsoft.com/office/drawing/2014/main" id="{D9F54596-4348-E2B3-FDF5-4405100A53C0}"/>
+              </a:ext>
+            </a:extLst>
+          </p:cNvPr>
+          <p:cNvPicPr>
+            <a:picLocks noChangeAspect="1"/>
+          </p:cNvPicPr>
+          <p:nvPr/>
+        </p:nvPicPr>
+        <p:blipFill rotWithShape="1">
+          <a:blip r:embed="rId2"/>
+          <a:srcRect b="6997"/>
+          <a:stretch/>
+        </p:blipFill>
+        <p:spPr>
+          <a:xfrm>
+            <a:off x="1623708" y="1036201"/>
+            <a:ext cx="7403750" cy="2645166"/>
+          </a:xfrm>
+          <a:prstGeom prst="rect">
+            <a:avLst/>
+          </a:prstGeom>
+        </p:spPr>
+      </p:pic>
+      <p:pic>
+        <p:nvPicPr>
+          <p:cNvPr id="13" name="Picture 12" descr="A graph with a line&#10;&#10;Description automatically generated">
+            <a:extLst>
+              <a:ext uri="{FF2B5EF4-FFF2-40B4-BE49-F238E27FC236}">
+                <a16:creationId xmlns:a16="http://schemas.microsoft.com/office/drawing/2014/main" id="{FD5FEA53-A26F-FD8F-3270-E68448B06A0F}"/>
+              </a:ext>
+            </a:extLst>
+          </p:cNvPr>
+          <p:cNvPicPr>
+            <a:picLocks noChangeAspect="1"/>
+          </p:cNvPicPr>
+          <p:nvPr/>
+        </p:nvPicPr>
+        <p:blipFill rotWithShape="1">
+          <a:blip r:embed="rId3"/>
+          <a:srcRect b="8820"/>
+          <a:stretch/>
+        </p:blipFill>
+        <p:spPr>
+          <a:xfrm>
+            <a:off x="1551989" y="3751004"/>
+            <a:ext cx="7483475" cy="2730478"/>
+          </a:xfrm>
+          <a:prstGeom prst="rect">
+            <a:avLst/>
+          </a:prstGeom>
+        </p:spPr>
+      </p:pic>
     </p:spTree>
     <p:extLst>
       <p:ext uri="{BB962C8B-B14F-4D97-AF65-F5344CB8AC3E}">
-        <p14:creationId xmlns:p14="http://schemas.microsoft.com/office/powerpoint/2010/main" val="2897117262"/>
+        <p14:creationId xmlns:p14="http://schemas.microsoft.com/office/powerpoint/2010/main" val="3379603533"/>
       </p:ext>
     </p:extLst>
   </p:cSld>
@@ -14352,7 +15298,7 @@
 </p:sld>
 </file>
 
-<file path=ppt/slides/slide27.xml><?xml version="1.0" encoding="utf-8"?>
+<file path=ppt/slides/slide29.xml><?xml version="1.0" encoding="utf-8"?>
 <p:sld xmlns:a="http://schemas.openxmlformats.org/drawingml/2006/main" xmlns:r="http://schemas.openxmlformats.org/officeDocument/2006/relationships" xmlns:p="http://schemas.openxmlformats.org/presentationml/2006/main">
   <p:cSld>
     <p:spTree>
@@ -14397,48 +15343,232 @@
           </a:p>
         </p:txBody>
       </p:sp>
-      <p:sp>
-        <p:nvSpPr>
-          <p:cNvPr id="3" name="Text Placeholder 2">
-            <a:extLst>
-              <a:ext uri="{FF2B5EF4-FFF2-40B4-BE49-F238E27FC236}">
-                <a16:creationId xmlns:a16="http://schemas.microsoft.com/office/drawing/2014/main" id="{2206BFC5-A718-B947-927D-637E13D22758}"/>
-              </a:ext>
-            </a:extLst>
-          </p:cNvPr>
-          <p:cNvSpPr>
-            <a:spLocks noGrp="1"/>
-          </p:cNvSpPr>
-          <p:nvPr>
-            <p:ph type="body" sz="quarter" idx="14"/>
-          </p:nvPr>
-        </p:nvSpPr>
-        <p:spPr/>
-        <p:txBody>
-          <a:bodyPr/>
-          <a:lstStyle/>
-          <a:p>
-            <a:pPr marL="342900" indent="-342900">
-              <a:buFont typeface="Wingdings" panose="05000000000000000000" pitchFamily="2" charset="2"/>
-              <a:buChar char="q"/>
-            </a:pPr>
-            <a:r>
-              <a:rPr lang="en-GB" sz="2000" dirty="0"/>
-              <a:t>Indirect Tack is defined as the maneuver when the sailboat aims to only tack once </a:t>
-            </a:r>
-          </a:p>
-          <a:p>
-            <a:pPr marL="342900" indent="-342900">
-              <a:buFont typeface="Wingdings" panose="05000000000000000000" pitchFamily="2" charset="2"/>
-              <a:buChar char="q"/>
-            </a:pPr>
-            <a:r>
-              <a:rPr lang="en-GB" sz="2000" dirty="0"/>
-              <a:t>This is achieved by sailing out to the lay line and once the lay line is reached tack back to the waypoint</a:t>
-            </a:r>
-          </a:p>
-        </p:txBody>
-      </p:sp>
+      <mc:AlternateContent xmlns:mc="http://schemas.openxmlformats.org/markup-compatibility/2006">
+        <mc:Choice xmlns:a14="http://schemas.microsoft.com/office/drawing/2010/main" Requires="a14">
+          <p:sp>
+            <p:nvSpPr>
+              <p:cNvPr id="3" name="Text Placeholder 2">
+                <a:extLst>
+                  <a:ext uri="{FF2B5EF4-FFF2-40B4-BE49-F238E27FC236}">
+                    <a16:creationId xmlns:a16="http://schemas.microsoft.com/office/drawing/2014/main" id="{2206BFC5-A718-B947-927D-637E13D22758}"/>
+                  </a:ext>
+                </a:extLst>
+              </p:cNvPr>
+              <p:cNvSpPr>
+                <a:spLocks noGrp="1"/>
+              </p:cNvSpPr>
+              <p:nvPr>
+                <p:ph type="body" sz="quarter" idx="14"/>
+              </p:nvPr>
+            </p:nvSpPr>
+            <p:spPr/>
+            <p:txBody>
+              <a:bodyPr/>
+              <a:lstStyle/>
+              <a:p>
+                <a:pPr marL="342900" indent="-342900">
+                  <a:buFont typeface="Wingdings" panose="05000000000000000000" pitchFamily="2" charset="2"/>
+                  <a:buChar char="q"/>
+                </a:pPr>
+                <a:r>
+                  <a:rPr lang="en-GB" sz="2000" dirty="0"/>
+                  <a:t>Indirect Tack is defined as the maneuver when the sailboat aims to only tack once </a:t>
+                </a:r>
+              </a:p>
+              <a:p>
+                <a:pPr marL="342900" indent="-342900">
+                  <a:buFont typeface="Wingdings" panose="05000000000000000000" pitchFamily="2" charset="2"/>
+                  <a:buChar char="q"/>
+                </a:pPr>
+                <a:r>
+                  <a:rPr lang="en-GB" sz="2000" dirty="0"/>
+                  <a:t>This is achieved by sailing out to the lay line and once the lay line is reached tack back to the waypoint</a:t>
+                </a:r>
+              </a:p>
+              <a:p>
+                <a:pPr marL="342900" indent="-342900">
+                  <a:buFont typeface="Wingdings" panose="05000000000000000000" pitchFamily="2" charset="2"/>
+                  <a:buChar char="q"/>
+                </a:pPr>
+                <a14:m>
+                  <m:oMath xmlns:m="http://schemas.openxmlformats.org/officeDocument/2006/math">
+                    <m:r>
+                      <m:rPr>
+                        <m:nor/>
+                      </m:rPr>
+                      <a:rPr lang="en-GB" sz="2000" dirty="0"/>
+                      <m:t>ϴ</m:t>
+                    </m:r>
+                    <m:r>
+                      <a:rPr lang="en-GB" sz="2000" i="1" smtClean="0">
+                        <a:latin typeface="Cambria Math" panose="02040503050406030204" pitchFamily="18" charset="0"/>
+                      </a:rPr>
+                      <m:t>=</m:t>
+                    </m:r>
+                    <m:func>
+                      <m:funcPr>
+                        <m:ctrlPr>
+                          <a:rPr lang="en-GB" sz="2000" i="1" smtClean="0">
+                            <a:latin typeface="Cambria Math" panose="02040503050406030204" pitchFamily="18" charset="0"/>
+                          </a:rPr>
+                        </m:ctrlPr>
+                      </m:funcPr>
+                      <m:fName>
+                        <m:sSup>
+                          <m:sSupPr>
+                            <m:ctrlPr>
+                              <a:rPr lang="en-GB" sz="2000" i="1" smtClean="0">
+                                <a:latin typeface="Cambria Math" panose="02040503050406030204" pitchFamily="18" charset="0"/>
+                              </a:rPr>
+                            </m:ctrlPr>
+                          </m:sSupPr>
+                          <m:e>
+                            <m:r>
+                              <m:rPr>
+                                <m:sty m:val="p"/>
+                              </m:rPr>
+                              <a:rPr lang="en-GB" sz="2000" i="0" smtClean="0">
+                                <a:latin typeface="Cambria Math" panose="02040503050406030204" pitchFamily="18" charset="0"/>
+                              </a:rPr>
+                              <m:t>tan</m:t>
+                            </m:r>
+                          </m:e>
+                          <m:sup>
+                            <m:r>
+                              <a:rPr lang="en-GB" sz="2000" i="1" smtClean="0">
+                                <a:latin typeface="Cambria Math" panose="02040503050406030204" pitchFamily="18" charset="0"/>
+                              </a:rPr>
+                              <m:t>−1</m:t>
+                            </m:r>
+                          </m:sup>
+                        </m:sSup>
+                      </m:fName>
+                      <m:e>
+                        <m:f>
+                          <m:fPr>
+                            <m:ctrlPr>
+                              <a:rPr lang="en-GB" sz="2000" b="0" i="1" smtClean="0">
+                                <a:latin typeface="Cambria Math" panose="02040503050406030204" pitchFamily="18" charset="0"/>
+                              </a:rPr>
+                            </m:ctrlPr>
+                          </m:fPr>
+                          <m:num>
+                            <m:r>
+                              <a:rPr lang="en-GB" sz="2000" b="0" i="1" smtClean="0">
+                                <a:latin typeface="Cambria Math" panose="02040503050406030204" pitchFamily="18" charset="0"/>
+                              </a:rPr>
+                              <m:t>𝐶𝑟𝑜𝑠𝑠</m:t>
+                            </m:r>
+                            <m:r>
+                              <a:rPr lang="en-GB" sz="2000" b="0" i="1" smtClean="0">
+                                <a:latin typeface="Cambria Math" panose="02040503050406030204" pitchFamily="18" charset="0"/>
+                              </a:rPr>
+                              <m:t> </m:t>
+                            </m:r>
+                            <m:r>
+                              <a:rPr lang="en-GB" sz="2000" b="0" i="1" smtClean="0">
+                                <a:latin typeface="Cambria Math" panose="02040503050406030204" pitchFamily="18" charset="0"/>
+                              </a:rPr>
+                              <m:t>𝑇𝑟𝑎𝑐𝑘</m:t>
+                            </m:r>
+                            <m:r>
+                              <a:rPr lang="en-GB" sz="2000" b="0" i="1" smtClean="0">
+                                <a:latin typeface="Cambria Math" panose="02040503050406030204" pitchFamily="18" charset="0"/>
+                              </a:rPr>
+                              <m:t> </m:t>
+                            </m:r>
+                            <m:r>
+                              <a:rPr lang="en-GB" sz="2000" b="0" i="1" smtClean="0">
+                                <a:latin typeface="Cambria Math" panose="02040503050406030204" pitchFamily="18" charset="0"/>
+                              </a:rPr>
+                              <m:t>𝐷𝑖𝑠𝑡𝑎𝑛𝑐𝑒</m:t>
+                            </m:r>
+                          </m:num>
+                          <m:den>
+                            <m:r>
+                              <a:rPr lang="en-GB" sz="2000" b="0" i="1" smtClean="0">
+                                <a:latin typeface="Cambria Math" panose="02040503050406030204" pitchFamily="18" charset="0"/>
+                              </a:rPr>
+                              <m:t>𝐷𝑖𝑠𝑡𝑎𝑛𝑐𝑒</m:t>
+                            </m:r>
+                            <m:r>
+                              <a:rPr lang="en-GB" sz="2000" b="0" i="1" smtClean="0">
+                                <a:latin typeface="Cambria Math" panose="02040503050406030204" pitchFamily="18" charset="0"/>
+                              </a:rPr>
+                              <m:t> </m:t>
+                            </m:r>
+                            <m:r>
+                              <a:rPr lang="en-GB" sz="2000" b="0" i="1" smtClean="0">
+                                <a:latin typeface="Cambria Math" panose="02040503050406030204" pitchFamily="18" charset="0"/>
+                              </a:rPr>
+                              <m:t>𝑡𝑜</m:t>
+                            </m:r>
+                            <m:r>
+                              <a:rPr lang="en-GB" sz="2000" b="0" i="1" smtClean="0">
+                                <a:latin typeface="Cambria Math" panose="02040503050406030204" pitchFamily="18" charset="0"/>
+                              </a:rPr>
+                              <m:t> </m:t>
+                            </m:r>
+                            <m:r>
+                              <a:rPr lang="en-GB" sz="2000" b="0" i="1" smtClean="0">
+                                <a:latin typeface="Cambria Math" panose="02040503050406030204" pitchFamily="18" charset="0"/>
+                              </a:rPr>
+                              <m:t>𝑊𝑎𝑦𝑝𝑜𝑡𝑖𝑛</m:t>
+                            </m:r>
+                          </m:den>
+                        </m:f>
+                      </m:e>
+                    </m:func>
+                  </m:oMath>
+                </a14:m>
+                <a:r>
+                  <a:rPr lang="en-GB" sz="2000" dirty="0"/>
+                  <a:t> </a:t>
+                </a:r>
+              </a:p>
+            </p:txBody>
+          </p:sp>
+        </mc:Choice>
+        <mc:Fallback>
+          <p:sp>
+            <p:nvSpPr>
+              <p:cNvPr id="3" name="Text Placeholder 2">
+                <a:extLst>
+                  <a:ext uri="{FF2B5EF4-FFF2-40B4-BE49-F238E27FC236}">
+                    <a16:creationId xmlns:a16="http://schemas.microsoft.com/office/drawing/2014/main" id="{2206BFC5-A718-B947-927D-637E13D22758}"/>
+                  </a:ext>
+                </a:extLst>
+              </p:cNvPr>
+              <p:cNvSpPr>
+                <a:spLocks noGrp="1" noRot="1" noChangeAspect="1" noMove="1" noResize="1" noEditPoints="1" noAdjustHandles="1" noChangeArrowheads="1" noChangeShapeType="1" noTextEdit="1"/>
+              </p:cNvSpPr>
+              <p:nvPr>
+                <p:ph type="body" sz="quarter" idx="14"/>
+              </p:nvPr>
+            </p:nvSpPr>
+            <p:spPr>
+              <a:blipFill>
+                <a:blip r:embed="rId2"/>
+                <a:stretch>
+                  <a:fillRect l="-763" t="-1256" r="-678"/>
+                </a:stretch>
+              </a:blipFill>
+            </p:spPr>
+            <p:txBody>
+              <a:bodyPr/>
+              <a:lstStyle/>
+              <a:p>
+                <a:r>
+                  <a:rPr lang="en-GB">
+                    <a:noFill/>
+                  </a:rPr>
+                  <a:t> </a:t>
+                </a:r>
+              </a:p>
+            </p:txBody>
+          </p:sp>
+        </mc:Fallback>
+      </mc:AlternateContent>
       <p:sp>
         <p:nvSpPr>
           <p:cNvPr id="4" name="TextBox 3">
@@ -14454,7 +15584,7 @@
         <p:spPr>
           <a:xfrm>
             <a:off x="0" y="1375962"/>
-            <a:ext cx="1371600" cy="1892826"/>
+            <a:ext cx="1371600" cy="2092881"/>
           </a:xfrm>
           <a:prstGeom prst="rect">
             <a:avLst/>
@@ -14635,7 +15765,7 @@
                 </a:solidFill>
                 <a:latin typeface="Calibri" panose="020F0502020204030204"/>
               </a:rPr>
-              <a:t>Sailboat Physics</a:t>
+              <a:t>Sailboat Simulation</a:t>
             </a:r>
             <a:endParaRPr kumimoji="0" lang="en-US" sz="1300" b="0" i="0" u="none" strike="noStrike" kern="1200" cap="none" spc="0" normalizeH="0" baseline="0" noProof="0" dirty="0">
               <a:ln>
@@ -14792,463 +15922,39 @@
           </a:p>
         </p:txBody>
       </p:sp>
+      <p:pic>
+        <p:nvPicPr>
+          <p:cNvPr id="10" name="Picture 9" descr="A graph with a red line&#10;&#10;Description automatically generated">
+            <a:extLst>
+              <a:ext uri="{FF2B5EF4-FFF2-40B4-BE49-F238E27FC236}">
+                <a16:creationId xmlns:a16="http://schemas.microsoft.com/office/drawing/2014/main" id="{D67649A4-F118-E7ED-26C7-9DA5E8365C76}"/>
+              </a:ext>
+            </a:extLst>
+          </p:cNvPr>
+          <p:cNvPicPr>
+            <a:picLocks noChangeAspect="1"/>
+          </p:cNvPicPr>
+          <p:nvPr/>
+        </p:nvPicPr>
+        <p:blipFill rotWithShape="1">
+          <a:blip r:embed="rId3"/>
+          <a:srcRect b="6288"/>
+          <a:stretch/>
+        </p:blipFill>
+        <p:spPr>
+          <a:xfrm>
+            <a:off x="1589236" y="3675031"/>
+            <a:ext cx="7490225" cy="2905063"/>
+          </a:xfrm>
+          <a:prstGeom prst="rect">
+            <a:avLst/>
+          </a:prstGeom>
+        </p:spPr>
+      </p:pic>
     </p:spTree>
     <p:extLst>
       <p:ext uri="{BB962C8B-B14F-4D97-AF65-F5344CB8AC3E}">
         <p14:creationId xmlns:p14="http://schemas.microsoft.com/office/powerpoint/2010/main" val="1670676796"/>
-      </p:ext>
-    </p:extLst>
-  </p:cSld>
-  <p:clrMapOvr>
-    <a:masterClrMapping/>
-  </p:clrMapOvr>
-</p:sld>
-</file>
-
-<file path=ppt/slides/slide28.xml><?xml version="1.0" encoding="utf-8"?>
-<p:sld xmlns:a="http://schemas.openxmlformats.org/drawingml/2006/main" xmlns:r="http://schemas.openxmlformats.org/officeDocument/2006/relationships" xmlns:p="http://schemas.openxmlformats.org/presentationml/2006/main">
-  <p:cSld>
-    <p:spTree>
-      <p:nvGrpSpPr>
-        <p:cNvPr id="1" name=""/>
-        <p:cNvGrpSpPr/>
-        <p:nvPr/>
-      </p:nvGrpSpPr>
-      <p:grpSpPr>
-        <a:xfrm>
-          <a:off x="0" y="0"/>
-          <a:ext cx="0" cy="0"/>
-          <a:chOff x="0" y="0"/>
-          <a:chExt cx="0" cy="0"/>
-        </a:xfrm>
-      </p:grpSpPr>
-      <p:sp>
-        <p:nvSpPr>
-          <p:cNvPr id="2" name="Text Placeholder 1">
-            <a:extLst>
-              <a:ext uri="{FF2B5EF4-FFF2-40B4-BE49-F238E27FC236}">
-                <a16:creationId xmlns:a16="http://schemas.microsoft.com/office/drawing/2014/main" id="{AA5A7C97-CD76-5BB3-CE48-0F28390E3D73}"/>
-              </a:ext>
-            </a:extLst>
-          </p:cNvPr>
-          <p:cNvSpPr>
-            <a:spLocks noGrp="1"/>
-          </p:cNvSpPr>
-          <p:nvPr>
-            <p:ph type="body" sz="quarter" idx="13"/>
-          </p:nvPr>
-        </p:nvSpPr>
-        <p:spPr/>
-        <p:txBody>
-          <a:bodyPr/>
-          <a:lstStyle/>
-          <a:p>
-            <a:r>
-              <a:rPr lang="en-GB" dirty="0"/>
-              <a:t>Motion Control: Zone Tack </a:t>
-            </a:r>
-          </a:p>
-        </p:txBody>
-      </p:sp>
-      <p:sp>
-        <p:nvSpPr>
-          <p:cNvPr id="3" name="Text Placeholder 2">
-            <a:extLst>
-              <a:ext uri="{FF2B5EF4-FFF2-40B4-BE49-F238E27FC236}">
-                <a16:creationId xmlns:a16="http://schemas.microsoft.com/office/drawing/2014/main" id="{29B4AC50-A569-B204-2E31-9E20DB267BD7}"/>
-              </a:ext>
-            </a:extLst>
-          </p:cNvPr>
-          <p:cNvSpPr>
-            <a:spLocks noGrp="1"/>
-          </p:cNvSpPr>
-          <p:nvPr>
-            <p:ph type="body" sz="quarter" idx="14"/>
-          </p:nvPr>
-        </p:nvSpPr>
-        <p:spPr/>
-        <p:txBody>
-          <a:bodyPr/>
-          <a:lstStyle/>
-          <a:p>
-            <a:pPr marL="285750" indent="-285750">
-              <a:buFont typeface="Wingdings" panose="05000000000000000000" pitchFamily="2" charset="2"/>
-              <a:buChar char="q"/>
-            </a:pPr>
-            <a:r>
-              <a:rPr lang="en-GB" sz="2000" dirty="0"/>
-              <a:t>Zone/Dynamic tack considers the wind angle when tacking</a:t>
-            </a:r>
-          </a:p>
-          <a:p>
-            <a:pPr marL="285750" indent="-285750">
-              <a:buFont typeface="Wingdings" panose="05000000000000000000" pitchFamily="2" charset="2"/>
-              <a:buChar char="q"/>
-            </a:pPr>
-            <a:r>
-              <a:rPr lang="en-GB" sz="2000" dirty="0"/>
-              <a:t>A tack switch is only performed when the wind forces it</a:t>
-            </a:r>
-          </a:p>
-        </p:txBody>
-      </p:sp>
-      <p:sp>
-        <p:nvSpPr>
-          <p:cNvPr id="4" name="TextBox 3">
-            <a:extLst>
-              <a:ext uri="{FF2B5EF4-FFF2-40B4-BE49-F238E27FC236}">
-                <a16:creationId xmlns:a16="http://schemas.microsoft.com/office/drawing/2014/main" id="{29CE1AC3-801B-916C-B676-DB8E5398AAF1}"/>
-              </a:ext>
-            </a:extLst>
-          </p:cNvPr>
-          <p:cNvSpPr txBox="1"/>
-          <p:nvPr/>
-        </p:nvSpPr>
-        <p:spPr>
-          <a:xfrm>
-            <a:off x="0" y="1375962"/>
-            <a:ext cx="1371600" cy="1892826"/>
-          </a:xfrm>
-          <a:prstGeom prst="rect">
-            <a:avLst/>
-          </a:prstGeom>
-          <a:noFill/>
-        </p:spPr>
-        <p:txBody>
-          <a:bodyPr wrap="square">
-            <a:spAutoFit/>
-          </a:bodyPr>
-          <a:lstStyle/>
-          <a:p>
-            <a:pPr marL="0" marR="0" lvl="0" indent="0" algn="l" defTabSz="457200" rtl="0" eaLnBrk="1" fontAlgn="auto" latinLnBrk="0" hangingPunct="1">
-              <a:lnSpc>
-                <a:spcPct val="100000"/>
-              </a:lnSpc>
-              <a:spcBef>
-                <a:spcPts val="0"/>
-              </a:spcBef>
-              <a:spcAft>
-                <a:spcPts val="0"/>
-              </a:spcAft>
-              <a:buClrTx/>
-              <a:buSzTx/>
-              <a:buFontTx/>
-              <a:buNone/>
-              <a:tabLst/>
-              <a:defRPr/>
-            </a:pPr>
-            <a:r>
-              <a:rPr kumimoji="0" lang="en-US" sz="1300" b="0" i="0" u="none" strike="noStrike" kern="1200" cap="none" spc="0" normalizeH="0" baseline="0" noProof="0" dirty="0">
-                <a:ln>
-                  <a:noFill/>
-                </a:ln>
-                <a:solidFill>
-                  <a:schemeClr val="bg1"/>
-                </a:solidFill>
-                <a:effectLst/>
-                <a:uLnTx/>
-                <a:uFillTx/>
-                <a:latin typeface="Calibri" panose="020F0502020204030204"/>
-                <a:ea typeface="+mn-ea"/>
-                <a:cs typeface="+mn-cs"/>
-              </a:rPr>
-              <a:t>Introduction</a:t>
-            </a:r>
-          </a:p>
-          <a:p>
-            <a:pPr marL="0" marR="0" lvl="0" indent="0" algn="l" defTabSz="457200" rtl="0" eaLnBrk="1" fontAlgn="auto" latinLnBrk="0" hangingPunct="1">
-              <a:lnSpc>
-                <a:spcPct val="100000"/>
-              </a:lnSpc>
-              <a:spcBef>
-                <a:spcPts val="0"/>
-              </a:spcBef>
-              <a:spcAft>
-                <a:spcPts val="0"/>
-              </a:spcAft>
-              <a:buClrTx/>
-              <a:buSzTx/>
-              <a:buFontTx/>
-              <a:buNone/>
-              <a:tabLst/>
-              <a:defRPr/>
-            </a:pPr>
-            <a:endParaRPr kumimoji="0" lang="en-US" sz="1300" b="0" i="0" u="none" strike="noStrike" kern="1200" cap="none" spc="0" normalizeH="0" baseline="0" noProof="0" dirty="0">
-              <a:ln>
-                <a:noFill/>
-              </a:ln>
-              <a:solidFill>
-                <a:prstClr val="white"/>
-              </a:solidFill>
-              <a:effectLst/>
-              <a:uLnTx/>
-              <a:uFillTx/>
-              <a:latin typeface="Calibri" panose="020F0502020204030204"/>
-              <a:ea typeface="+mn-ea"/>
-              <a:cs typeface="+mn-cs"/>
-            </a:endParaRPr>
-          </a:p>
-          <a:p>
-            <a:pPr marL="0" marR="0" lvl="0" indent="0" algn="l" defTabSz="457200" rtl="0" eaLnBrk="1" fontAlgn="auto" latinLnBrk="0" hangingPunct="1">
-              <a:lnSpc>
-                <a:spcPct val="100000"/>
-              </a:lnSpc>
-              <a:spcBef>
-                <a:spcPts val="0"/>
-              </a:spcBef>
-              <a:spcAft>
-                <a:spcPts val="0"/>
-              </a:spcAft>
-              <a:buClrTx/>
-              <a:buSzTx/>
-              <a:buFontTx/>
-              <a:buNone/>
-              <a:tabLst/>
-              <a:defRPr/>
-            </a:pPr>
-            <a:r>
-              <a:rPr lang="en-US" sz="1300" dirty="0">
-                <a:solidFill>
-                  <a:schemeClr val="bg1"/>
-                </a:solidFill>
-                <a:latin typeface="Calibri" panose="020F0502020204030204"/>
-              </a:rPr>
-              <a:t>Overview</a:t>
-            </a:r>
-            <a:endParaRPr kumimoji="0" lang="en-US" sz="1300" b="0" i="0" u="none" strike="noStrike" kern="1200" cap="none" spc="0" normalizeH="0" baseline="0" noProof="0" dirty="0">
-              <a:ln>
-                <a:noFill/>
-              </a:ln>
-              <a:solidFill>
-                <a:schemeClr val="bg1"/>
-              </a:solidFill>
-              <a:effectLst/>
-              <a:uLnTx/>
-              <a:uFillTx/>
-              <a:latin typeface="Calibri" panose="020F0502020204030204"/>
-              <a:ea typeface="+mn-ea"/>
-              <a:cs typeface="+mn-cs"/>
-            </a:endParaRPr>
-          </a:p>
-          <a:p>
-            <a:pPr marL="0" marR="0" lvl="0" indent="0" algn="l" defTabSz="457200" rtl="0" eaLnBrk="1" fontAlgn="auto" latinLnBrk="0" hangingPunct="1">
-              <a:lnSpc>
-                <a:spcPct val="100000"/>
-              </a:lnSpc>
-              <a:spcBef>
-                <a:spcPts val="0"/>
-              </a:spcBef>
-              <a:spcAft>
-                <a:spcPts val="0"/>
-              </a:spcAft>
-              <a:buClrTx/>
-              <a:buSzTx/>
-              <a:buFontTx/>
-              <a:buNone/>
-              <a:tabLst/>
-              <a:defRPr/>
-            </a:pPr>
-            <a:endParaRPr kumimoji="0" lang="en-US" sz="1300" b="0" i="0" u="none" strike="noStrike" kern="1200" cap="none" spc="0" normalizeH="0" baseline="0" noProof="0" dirty="0">
-              <a:ln>
-                <a:noFill/>
-              </a:ln>
-              <a:solidFill>
-                <a:prstClr val="white"/>
-              </a:solidFill>
-              <a:effectLst/>
-              <a:uLnTx/>
-              <a:uFillTx/>
-              <a:latin typeface="Calibri" panose="020F0502020204030204"/>
-              <a:ea typeface="+mn-ea"/>
-              <a:cs typeface="+mn-cs"/>
-            </a:endParaRPr>
-          </a:p>
-          <a:p>
-            <a:pPr marL="0" marR="0" lvl="0" indent="0" algn="l" defTabSz="457200" rtl="0" eaLnBrk="1" fontAlgn="auto" latinLnBrk="0" hangingPunct="1">
-              <a:lnSpc>
-                <a:spcPct val="100000"/>
-              </a:lnSpc>
-              <a:spcBef>
-                <a:spcPts val="0"/>
-              </a:spcBef>
-              <a:spcAft>
-                <a:spcPts val="0"/>
-              </a:spcAft>
-              <a:buClrTx/>
-              <a:buSzTx/>
-              <a:buFontTx/>
-              <a:buNone/>
-              <a:tabLst/>
-              <a:defRPr/>
-            </a:pPr>
-            <a:r>
-              <a:rPr lang="en-US" sz="1300" dirty="0">
-                <a:solidFill>
-                  <a:schemeClr val="bg1"/>
-                </a:solidFill>
-                <a:latin typeface="Calibri" panose="020F0502020204030204"/>
-              </a:rPr>
-              <a:t>Sailboat Physics</a:t>
-            </a:r>
-            <a:endParaRPr kumimoji="0" lang="en-US" sz="1300" b="0" i="0" u="none" strike="noStrike" kern="1200" cap="none" spc="0" normalizeH="0" baseline="0" noProof="0" dirty="0">
-              <a:ln>
-                <a:noFill/>
-              </a:ln>
-              <a:solidFill>
-                <a:schemeClr val="bg1"/>
-              </a:solidFill>
-              <a:effectLst/>
-              <a:uLnTx/>
-              <a:uFillTx/>
-              <a:latin typeface="Calibri" panose="020F0502020204030204"/>
-              <a:ea typeface="+mn-ea"/>
-              <a:cs typeface="+mn-cs"/>
-            </a:endParaRPr>
-          </a:p>
-          <a:p>
-            <a:pPr marL="0" marR="0" lvl="0" indent="0" algn="l" defTabSz="457200" rtl="0" eaLnBrk="1" fontAlgn="auto" latinLnBrk="0" hangingPunct="1">
-              <a:lnSpc>
-                <a:spcPct val="100000"/>
-              </a:lnSpc>
-              <a:spcBef>
-                <a:spcPts val="0"/>
-              </a:spcBef>
-              <a:spcAft>
-                <a:spcPts val="0"/>
-              </a:spcAft>
-              <a:buClrTx/>
-              <a:buSzTx/>
-              <a:buFontTx/>
-              <a:buNone/>
-              <a:tabLst/>
-              <a:defRPr/>
-            </a:pPr>
-            <a:endParaRPr kumimoji="0" lang="en-US" sz="1300" b="0" i="0" u="none" strike="noStrike" kern="1200" cap="none" spc="0" normalizeH="0" baseline="0" noProof="0" dirty="0">
-              <a:ln>
-                <a:noFill/>
-              </a:ln>
-              <a:solidFill>
-                <a:prstClr val="white"/>
-              </a:solidFill>
-              <a:effectLst/>
-              <a:uLnTx/>
-              <a:uFillTx/>
-              <a:latin typeface="Calibri" panose="020F0502020204030204"/>
-              <a:ea typeface="+mn-ea"/>
-              <a:cs typeface="+mn-cs"/>
-            </a:endParaRPr>
-          </a:p>
-          <a:p>
-            <a:pPr marL="0" marR="0" lvl="0" indent="0" algn="l" defTabSz="457200" rtl="0" eaLnBrk="1" fontAlgn="auto" latinLnBrk="0" hangingPunct="1">
-              <a:lnSpc>
-                <a:spcPct val="100000"/>
-              </a:lnSpc>
-              <a:spcBef>
-                <a:spcPts val="0"/>
-              </a:spcBef>
-              <a:spcAft>
-                <a:spcPts val="0"/>
-              </a:spcAft>
-              <a:buClrTx/>
-              <a:buSzTx/>
-              <a:buFontTx/>
-              <a:buNone/>
-              <a:tabLst/>
-              <a:defRPr/>
-            </a:pPr>
-            <a:r>
-              <a:rPr kumimoji="0" lang="en-US" sz="1300" b="0" i="0" u="none" strike="noStrike" kern="1200" cap="none" spc="0" normalizeH="0" baseline="0" noProof="0" dirty="0">
-                <a:ln>
-                  <a:noFill/>
-                </a:ln>
-                <a:solidFill>
-                  <a:schemeClr val="accent4"/>
-                </a:solidFill>
-                <a:effectLst/>
-                <a:uLnTx/>
-                <a:uFillTx/>
-                <a:latin typeface="Calibri" panose="020F0502020204030204"/>
-                <a:ea typeface="+mn-ea"/>
-                <a:cs typeface="+mn-cs"/>
-              </a:rPr>
-              <a:t>Motion Control</a:t>
-            </a:r>
-          </a:p>
-          <a:p>
-            <a:pPr marL="0" marR="0" lvl="0" indent="0" algn="l" defTabSz="457200" rtl="0" eaLnBrk="1" fontAlgn="auto" latinLnBrk="0" hangingPunct="1">
-              <a:lnSpc>
-                <a:spcPct val="100000"/>
-              </a:lnSpc>
-              <a:spcBef>
-                <a:spcPts val="0"/>
-              </a:spcBef>
-              <a:spcAft>
-                <a:spcPts val="0"/>
-              </a:spcAft>
-              <a:buClrTx/>
-              <a:buSzTx/>
-              <a:buFontTx/>
-              <a:buNone/>
-              <a:tabLst/>
-              <a:defRPr/>
-            </a:pPr>
-            <a:endParaRPr kumimoji="0" lang="en-US" sz="1300" b="0" i="0" u="none" strike="noStrike" kern="1200" cap="none" spc="0" normalizeH="0" baseline="0" noProof="0" dirty="0">
-              <a:ln>
-                <a:noFill/>
-              </a:ln>
-              <a:solidFill>
-                <a:prstClr val="white"/>
-              </a:solidFill>
-              <a:effectLst/>
-              <a:uLnTx/>
-              <a:uFillTx/>
-              <a:latin typeface="Calibri" panose="020F0502020204030204"/>
-              <a:ea typeface="+mn-ea"/>
-              <a:cs typeface="+mn-cs"/>
-            </a:endParaRPr>
-          </a:p>
-          <a:p>
-            <a:pPr marL="0" marR="0" lvl="0" indent="0" algn="l" defTabSz="457200" rtl="0" eaLnBrk="1" fontAlgn="auto" latinLnBrk="0" hangingPunct="1">
-              <a:lnSpc>
-                <a:spcPct val="100000"/>
-              </a:lnSpc>
-              <a:spcBef>
-                <a:spcPts val="0"/>
-              </a:spcBef>
-              <a:spcAft>
-                <a:spcPts val="0"/>
-              </a:spcAft>
-              <a:buClrTx/>
-              <a:buSzTx/>
-              <a:buFontTx/>
-              <a:buNone/>
-              <a:tabLst/>
-              <a:defRPr/>
-            </a:pPr>
-            <a:r>
-              <a:rPr kumimoji="0" lang="en-US" sz="1300" b="0" i="0" u="none" strike="noStrike" kern="1200" cap="none" spc="0" normalizeH="0" baseline="0" noProof="0" dirty="0">
-                <a:ln>
-                  <a:noFill/>
-                </a:ln>
-                <a:solidFill>
-                  <a:prstClr val="white"/>
-                </a:solidFill>
-                <a:effectLst/>
-                <a:uLnTx/>
-                <a:uFillTx/>
-                <a:latin typeface="Calibri" panose="020F0502020204030204"/>
-                <a:ea typeface="+mn-ea"/>
-                <a:cs typeface="+mn-cs"/>
-              </a:rPr>
-              <a:t>Future Work</a:t>
-            </a:r>
-          </a:p>
-        </p:txBody>
-      </p:sp>
-    </p:spTree>
-    <p:extLst>
-      <p:ext uri="{BB962C8B-B14F-4D97-AF65-F5344CB8AC3E}">
-        <p14:creationId xmlns:p14="http://schemas.microsoft.com/office/powerpoint/2010/main" val="2455334266"/>
       </p:ext>
     </p:extLst>
   </p:cSld>
@@ -15400,7 +16106,7 @@
         <p:spPr>
           <a:xfrm>
             <a:off x="0" y="1375962"/>
-            <a:ext cx="1371600" cy="1892826"/>
+            <a:ext cx="1371600" cy="2092881"/>
           </a:xfrm>
           <a:prstGeom prst="rect">
             <a:avLst/>
@@ -15581,7 +16287,7 @@
                 </a:solidFill>
                 <a:latin typeface="Calibri" panose="020F0502020204030204"/>
               </a:rPr>
-              <a:t>Sailboat Physics</a:t>
+              <a:t>Sailboat Simulation</a:t>
             </a:r>
             <a:endParaRPr kumimoji="0" lang="en-US" sz="1300" b="0" i="0" u="none" strike="noStrike" kern="1200" cap="none" spc="0" normalizeH="0" baseline="0" noProof="0" dirty="0">
               <a:ln>
@@ -15771,6 +16477,459 @@
     <p:extLst>
       <p:ext uri="{BB962C8B-B14F-4D97-AF65-F5344CB8AC3E}">
         <p14:creationId xmlns:p14="http://schemas.microsoft.com/office/powerpoint/2010/main" val="1666334416"/>
+      </p:ext>
+    </p:extLst>
+  </p:cSld>
+  <p:clrMapOvr>
+    <a:masterClrMapping/>
+  </p:clrMapOvr>
+</p:sld>
+</file>
+
+<file path=ppt/slides/slide30.xml><?xml version="1.0" encoding="utf-8"?>
+<p:sld xmlns:a="http://schemas.openxmlformats.org/drawingml/2006/main" xmlns:r="http://schemas.openxmlformats.org/officeDocument/2006/relationships" xmlns:p="http://schemas.openxmlformats.org/presentationml/2006/main">
+  <p:cSld>
+    <p:spTree>
+      <p:nvGrpSpPr>
+        <p:cNvPr id="1" name=""/>
+        <p:cNvGrpSpPr/>
+        <p:nvPr/>
+      </p:nvGrpSpPr>
+      <p:grpSpPr>
+        <a:xfrm>
+          <a:off x="0" y="0"/>
+          <a:ext cx="0" cy="0"/>
+          <a:chOff x="0" y="0"/>
+          <a:chExt cx="0" cy="0"/>
+        </a:xfrm>
+      </p:grpSpPr>
+      <p:sp>
+        <p:nvSpPr>
+          <p:cNvPr id="2" name="Text Placeholder 1">
+            <a:extLst>
+              <a:ext uri="{FF2B5EF4-FFF2-40B4-BE49-F238E27FC236}">
+                <a16:creationId xmlns:a16="http://schemas.microsoft.com/office/drawing/2014/main" id="{AA5A7C97-CD76-5BB3-CE48-0F28390E3D73}"/>
+              </a:ext>
+            </a:extLst>
+          </p:cNvPr>
+          <p:cNvSpPr>
+            <a:spLocks noGrp="1"/>
+          </p:cNvSpPr>
+          <p:nvPr>
+            <p:ph type="body" sz="quarter" idx="13"/>
+          </p:nvPr>
+        </p:nvSpPr>
+        <p:spPr/>
+        <p:txBody>
+          <a:bodyPr/>
+          <a:lstStyle/>
+          <a:p>
+            <a:r>
+              <a:rPr lang="en-GB" dirty="0"/>
+              <a:t>Motion Control: Zone Tack </a:t>
+            </a:r>
+          </a:p>
+        </p:txBody>
+      </p:sp>
+      <p:sp>
+        <p:nvSpPr>
+          <p:cNvPr id="3" name="Text Placeholder 2">
+            <a:extLst>
+              <a:ext uri="{FF2B5EF4-FFF2-40B4-BE49-F238E27FC236}">
+                <a16:creationId xmlns:a16="http://schemas.microsoft.com/office/drawing/2014/main" id="{29B4AC50-A569-B204-2E31-9E20DB267BD7}"/>
+              </a:ext>
+            </a:extLst>
+          </p:cNvPr>
+          <p:cNvSpPr>
+            <a:spLocks noGrp="1"/>
+          </p:cNvSpPr>
+          <p:nvPr>
+            <p:ph type="body" sz="quarter" idx="14"/>
+          </p:nvPr>
+        </p:nvSpPr>
+        <p:spPr/>
+        <p:txBody>
+          <a:bodyPr/>
+          <a:lstStyle/>
+          <a:p>
+            <a:pPr marL="285750" indent="-285750">
+              <a:buFont typeface="Wingdings" panose="05000000000000000000" pitchFamily="2" charset="2"/>
+              <a:buChar char="q"/>
+            </a:pPr>
+            <a:r>
+              <a:rPr lang="en-GB" sz="2000" dirty="0"/>
+              <a:t>Zone/Dynamic tack considers the wind angle when tacking</a:t>
+            </a:r>
+          </a:p>
+          <a:p>
+            <a:pPr marL="285750" indent="-285750">
+              <a:buFont typeface="Wingdings" panose="05000000000000000000" pitchFamily="2" charset="2"/>
+              <a:buChar char="q"/>
+            </a:pPr>
+            <a:r>
+              <a:rPr lang="en-GB" sz="2000" dirty="0"/>
+              <a:t>A tack switch is only performed when the wind forces it</a:t>
+            </a:r>
+          </a:p>
+        </p:txBody>
+      </p:sp>
+      <p:sp>
+        <p:nvSpPr>
+          <p:cNvPr id="4" name="TextBox 3">
+            <a:extLst>
+              <a:ext uri="{FF2B5EF4-FFF2-40B4-BE49-F238E27FC236}">
+                <a16:creationId xmlns:a16="http://schemas.microsoft.com/office/drawing/2014/main" id="{29CE1AC3-801B-916C-B676-DB8E5398AAF1}"/>
+              </a:ext>
+            </a:extLst>
+          </p:cNvPr>
+          <p:cNvSpPr txBox="1"/>
+          <p:nvPr/>
+        </p:nvSpPr>
+        <p:spPr>
+          <a:xfrm>
+            <a:off x="0" y="1375962"/>
+            <a:ext cx="1371600" cy="2092881"/>
+          </a:xfrm>
+          <a:prstGeom prst="rect">
+            <a:avLst/>
+          </a:prstGeom>
+          <a:noFill/>
+        </p:spPr>
+        <p:txBody>
+          <a:bodyPr wrap="square">
+            <a:spAutoFit/>
+          </a:bodyPr>
+          <a:lstStyle/>
+          <a:p>
+            <a:pPr marL="0" marR="0" lvl="0" indent="0" algn="l" defTabSz="457200" rtl="0" eaLnBrk="1" fontAlgn="auto" latinLnBrk="0" hangingPunct="1">
+              <a:lnSpc>
+                <a:spcPct val="100000"/>
+              </a:lnSpc>
+              <a:spcBef>
+                <a:spcPts val="0"/>
+              </a:spcBef>
+              <a:spcAft>
+                <a:spcPts val="0"/>
+              </a:spcAft>
+              <a:buClrTx/>
+              <a:buSzTx/>
+              <a:buFontTx/>
+              <a:buNone/>
+              <a:tabLst/>
+              <a:defRPr/>
+            </a:pPr>
+            <a:r>
+              <a:rPr kumimoji="0" lang="en-US" sz="1300" b="0" i="0" u="none" strike="noStrike" kern="1200" cap="none" spc="0" normalizeH="0" baseline="0" noProof="0" dirty="0">
+                <a:ln>
+                  <a:noFill/>
+                </a:ln>
+                <a:solidFill>
+                  <a:schemeClr val="bg1"/>
+                </a:solidFill>
+                <a:effectLst/>
+                <a:uLnTx/>
+                <a:uFillTx/>
+                <a:latin typeface="Calibri" panose="020F0502020204030204"/>
+                <a:ea typeface="+mn-ea"/>
+                <a:cs typeface="+mn-cs"/>
+              </a:rPr>
+              <a:t>Introduction</a:t>
+            </a:r>
+          </a:p>
+          <a:p>
+            <a:pPr marL="0" marR="0" lvl="0" indent="0" algn="l" defTabSz="457200" rtl="0" eaLnBrk="1" fontAlgn="auto" latinLnBrk="0" hangingPunct="1">
+              <a:lnSpc>
+                <a:spcPct val="100000"/>
+              </a:lnSpc>
+              <a:spcBef>
+                <a:spcPts val="0"/>
+              </a:spcBef>
+              <a:spcAft>
+                <a:spcPts val="0"/>
+              </a:spcAft>
+              <a:buClrTx/>
+              <a:buSzTx/>
+              <a:buFontTx/>
+              <a:buNone/>
+              <a:tabLst/>
+              <a:defRPr/>
+            </a:pPr>
+            <a:endParaRPr kumimoji="0" lang="en-US" sz="1300" b="0" i="0" u="none" strike="noStrike" kern="1200" cap="none" spc="0" normalizeH="0" baseline="0" noProof="0" dirty="0">
+              <a:ln>
+                <a:noFill/>
+              </a:ln>
+              <a:solidFill>
+                <a:prstClr val="white"/>
+              </a:solidFill>
+              <a:effectLst/>
+              <a:uLnTx/>
+              <a:uFillTx/>
+              <a:latin typeface="Calibri" panose="020F0502020204030204"/>
+              <a:ea typeface="+mn-ea"/>
+              <a:cs typeface="+mn-cs"/>
+            </a:endParaRPr>
+          </a:p>
+          <a:p>
+            <a:pPr marL="0" marR="0" lvl="0" indent="0" algn="l" defTabSz="457200" rtl="0" eaLnBrk="1" fontAlgn="auto" latinLnBrk="0" hangingPunct="1">
+              <a:lnSpc>
+                <a:spcPct val="100000"/>
+              </a:lnSpc>
+              <a:spcBef>
+                <a:spcPts val="0"/>
+              </a:spcBef>
+              <a:spcAft>
+                <a:spcPts val="0"/>
+              </a:spcAft>
+              <a:buClrTx/>
+              <a:buSzTx/>
+              <a:buFontTx/>
+              <a:buNone/>
+              <a:tabLst/>
+              <a:defRPr/>
+            </a:pPr>
+            <a:r>
+              <a:rPr lang="en-US" sz="1300" dirty="0">
+                <a:solidFill>
+                  <a:schemeClr val="bg1"/>
+                </a:solidFill>
+                <a:latin typeface="Calibri" panose="020F0502020204030204"/>
+              </a:rPr>
+              <a:t>Overview</a:t>
+            </a:r>
+            <a:endParaRPr kumimoji="0" lang="en-US" sz="1300" b="0" i="0" u="none" strike="noStrike" kern="1200" cap="none" spc="0" normalizeH="0" baseline="0" noProof="0" dirty="0">
+              <a:ln>
+                <a:noFill/>
+              </a:ln>
+              <a:solidFill>
+                <a:schemeClr val="bg1"/>
+              </a:solidFill>
+              <a:effectLst/>
+              <a:uLnTx/>
+              <a:uFillTx/>
+              <a:latin typeface="Calibri" panose="020F0502020204030204"/>
+              <a:ea typeface="+mn-ea"/>
+              <a:cs typeface="+mn-cs"/>
+            </a:endParaRPr>
+          </a:p>
+          <a:p>
+            <a:pPr marL="0" marR="0" lvl="0" indent="0" algn="l" defTabSz="457200" rtl="0" eaLnBrk="1" fontAlgn="auto" latinLnBrk="0" hangingPunct="1">
+              <a:lnSpc>
+                <a:spcPct val="100000"/>
+              </a:lnSpc>
+              <a:spcBef>
+                <a:spcPts val="0"/>
+              </a:spcBef>
+              <a:spcAft>
+                <a:spcPts val="0"/>
+              </a:spcAft>
+              <a:buClrTx/>
+              <a:buSzTx/>
+              <a:buFontTx/>
+              <a:buNone/>
+              <a:tabLst/>
+              <a:defRPr/>
+            </a:pPr>
+            <a:endParaRPr kumimoji="0" lang="en-US" sz="1300" b="0" i="0" u="none" strike="noStrike" kern="1200" cap="none" spc="0" normalizeH="0" baseline="0" noProof="0" dirty="0">
+              <a:ln>
+                <a:noFill/>
+              </a:ln>
+              <a:solidFill>
+                <a:prstClr val="white"/>
+              </a:solidFill>
+              <a:effectLst/>
+              <a:uLnTx/>
+              <a:uFillTx/>
+              <a:latin typeface="Calibri" panose="020F0502020204030204"/>
+              <a:ea typeface="+mn-ea"/>
+              <a:cs typeface="+mn-cs"/>
+            </a:endParaRPr>
+          </a:p>
+          <a:p>
+            <a:pPr marL="0" marR="0" lvl="0" indent="0" algn="l" defTabSz="457200" rtl="0" eaLnBrk="1" fontAlgn="auto" latinLnBrk="0" hangingPunct="1">
+              <a:lnSpc>
+                <a:spcPct val="100000"/>
+              </a:lnSpc>
+              <a:spcBef>
+                <a:spcPts val="0"/>
+              </a:spcBef>
+              <a:spcAft>
+                <a:spcPts val="0"/>
+              </a:spcAft>
+              <a:buClrTx/>
+              <a:buSzTx/>
+              <a:buFontTx/>
+              <a:buNone/>
+              <a:tabLst/>
+              <a:defRPr/>
+            </a:pPr>
+            <a:r>
+              <a:rPr lang="en-US" sz="1300" dirty="0">
+                <a:solidFill>
+                  <a:schemeClr val="bg1"/>
+                </a:solidFill>
+                <a:latin typeface="Calibri" panose="020F0502020204030204"/>
+              </a:rPr>
+              <a:t>Sailboat Simulation</a:t>
+            </a:r>
+            <a:endParaRPr kumimoji="0" lang="en-US" sz="1300" b="0" i="0" u="none" strike="noStrike" kern="1200" cap="none" spc="0" normalizeH="0" baseline="0" noProof="0" dirty="0">
+              <a:ln>
+                <a:noFill/>
+              </a:ln>
+              <a:solidFill>
+                <a:schemeClr val="bg1"/>
+              </a:solidFill>
+              <a:effectLst/>
+              <a:uLnTx/>
+              <a:uFillTx/>
+              <a:latin typeface="Calibri" panose="020F0502020204030204"/>
+              <a:ea typeface="+mn-ea"/>
+              <a:cs typeface="+mn-cs"/>
+            </a:endParaRPr>
+          </a:p>
+          <a:p>
+            <a:pPr marL="0" marR="0" lvl="0" indent="0" algn="l" defTabSz="457200" rtl="0" eaLnBrk="1" fontAlgn="auto" latinLnBrk="0" hangingPunct="1">
+              <a:lnSpc>
+                <a:spcPct val="100000"/>
+              </a:lnSpc>
+              <a:spcBef>
+                <a:spcPts val="0"/>
+              </a:spcBef>
+              <a:spcAft>
+                <a:spcPts val="0"/>
+              </a:spcAft>
+              <a:buClrTx/>
+              <a:buSzTx/>
+              <a:buFontTx/>
+              <a:buNone/>
+              <a:tabLst/>
+              <a:defRPr/>
+            </a:pPr>
+            <a:endParaRPr kumimoji="0" lang="en-US" sz="1300" b="0" i="0" u="none" strike="noStrike" kern="1200" cap="none" spc="0" normalizeH="0" baseline="0" noProof="0" dirty="0">
+              <a:ln>
+                <a:noFill/>
+              </a:ln>
+              <a:solidFill>
+                <a:prstClr val="white"/>
+              </a:solidFill>
+              <a:effectLst/>
+              <a:uLnTx/>
+              <a:uFillTx/>
+              <a:latin typeface="Calibri" panose="020F0502020204030204"/>
+              <a:ea typeface="+mn-ea"/>
+              <a:cs typeface="+mn-cs"/>
+            </a:endParaRPr>
+          </a:p>
+          <a:p>
+            <a:pPr marL="0" marR="0" lvl="0" indent="0" algn="l" defTabSz="457200" rtl="0" eaLnBrk="1" fontAlgn="auto" latinLnBrk="0" hangingPunct="1">
+              <a:lnSpc>
+                <a:spcPct val="100000"/>
+              </a:lnSpc>
+              <a:spcBef>
+                <a:spcPts val="0"/>
+              </a:spcBef>
+              <a:spcAft>
+                <a:spcPts val="0"/>
+              </a:spcAft>
+              <a:buClrTx/>
+              <a:buSzTx/>
+              <a:buFontTx/>
+              <a:buNone/>
+              <a:tabLst/>
+              <a:defRPr/>
+            </a:pPr>
+            <a:r>
+              <a:rPr kumimoji="0" lang="en-US" sz="1300" b="0" i="0" u="none" strike="noStrike" kern="1200" cap="none" spc="0" normalizeH="0" baseline="0" noProof="0" dirty="0">
+                <a:ln>
+                  <a:noFill/>
+                </a:ln>
+                <a:solidFill>
+                  <a:schemeClr val="accent4"/>
+                </a:solidFill>
+                <a:effectLst/>
+                <a:uLnTx/>
+                <a:uFillTx/>
+                <a:latin typeface="Calibri" panose="020F0502020204030204"/>
+                <a:ea typeface="+mn-ea"/>
+                <a:cs typeface="+mn-cs"/>
+              </a:rPr>
+              <a:t>Motion Control</a:t>
+            </a:r>
+          </a:p>
+          <a:p>
+            <a:pPr marL="0" marR="0" lvl="0" indent="0" algn="l" defTabSz="457200" rtl="0" eaLnBrk="1" fontAlgn="auto" latinLnBrk="0" hangingPunct="1">
+              <a:lnSpc>
+                <a:spcPct val="100000"/>
+              </a:lnSpc>
+              <a:spcBef>
+                <a:spcPts val="0"/>
+              </a:spcBef>
+              <a:spcAft>
+                <a:spcPts val="0"/>
+              </a:spcAft>
+              <a:buClrTx/>
+              <a:buSzTx/>
+              <a:buFontTx/>
+              <a:buNone/>
+              <a:tabLst/>
+              <a:defRPr/>
+            </a:pPr>
+            <a:endParaRPr kumimoji="0" lang="en-US" sz="1300" b="0" i="0" u="none" strike="noStrike" kern="1200" cap="none" spc="0" normalizeH="0" baseline="0" noProof="0" dirty="0">
+              <a:ln>
+                <a:noFill/>
+              </a:ln>
+              <a:solidFill>
+                <a:prstClr val="white"/>
+              </a:solidFill>
+              <a:effectLst/>
+              <a:uLnTx/>
+              <a:uFillTx/>
+              <a:latin typeface="Calibri" panose="020F0502020204030204"/>
+              <a:ea typeface="+mn-ea"/>
+              <a:cs typeface="+mn-cs"/>
+            </a:endParaRPr>
+          </a:p>
+          <a:p>
+            <a:pPr marL="0" marR="0" lvl="0" indent="0" algn="l" defTabSz="457200" rtl="0" eaLnBrk="1" fontAlgn="auto" latinLnBrk="0" hangingPunct="1">
+              <a:lnSpc>
+                <a:spcPct val="100000"/>
+              </a:lnSpc>
+              <a:spcBef>
+                <a:spcPts val="0"/>
+              </a:spcBef>
+              <a:spcAft>
+                <a:spcPts val="0"/>
+              </a:spcAft>
+              <a:buClrTx/>
+              <a:buSzTx/>
+              <a:buFontTx/>
+              <a:buNone/>
+              <a:tabLst/>
+              <a:defRPr/>
+            </a:pPr>
+            <a:r>
+              <a:rPr kumimoji="0" lang="en-US" sz="1300" b="0" i="0" u="none" strike="noStrike" kern="1200" cap="none" spc="0" normalizeH="0" baseline="0" noProof="0" dirty="0">
+                <a:ln>
+                  <a:noFill/>
+                </a:ln>
+                <a:solidFill>
+                  <a:prstClr val="white"/>
+                </a:solidFill>
+                <a:effectLst/>
+                <a:uLnTx/>
+                <a:uFillTx/>
+                <a:latin typeface="Calibri" panose="020F0502020204030204"/>
+                <a:ea typeface="+mn-ea"/>
+                <a:cs typeface="+mn-cs"/>
+              </a:rPr>
+              <a:t>Future Work</a:t>
+            </a:r>
+          </a:p>
+        </p:txBody>
+      </p:sp>
+    </p:spTree>
+    <p:extLst>
+      <p:ext uri="{BB962C8B-B14F-4D97-AF65-F5344CB8AC3E}">
+        <p14:creationId xmlns:p14="http://schemas.microsoft.com/office/powerpoint/2010/main" val="2455334266"/>
       </p:ext>
     </p:extLst>
   </p:cSld>
@@ -15873,7 +17032,7 @@
         <p:spPr>
           <a:xfrm>
             <a:off x="0" y="1375962"/>
-            <a:ext cx="1371600" cy="1892826"/>
+            <a:ext cx="1371600" cy="2092881"/>
           </a:xfrm>
           <a:prstGeom prst="rect">
             <a:avLst/>
@@ -16054,7 +17213,7 @@
                 </a:solidFill>
                 <a:latin typeface="Calibri" panose="020F0502020204030204"/>
               </a:rPr>
-              <a:t>Sailboat Physics</a:t>
+              <a:t>Sailboat Simulation</a:t>
             </a:r>
             <a:endParaRPr kumimoji="0" lang="en-US" sz="1300" b="0" i="0" u="none" strike="noStrike" kern="1200" cap="none" spc="0" normalizeH="0" baseline="0" noProof="0" dirty="0">
               <a:ln>
@@ -16325,7 +17484,7 @@
         <p:spPr>
           <a:xfrm>
             <a:off x="0" y="1375962"/>
-            <a:ext cx="1371600" cy="1892826"/>
+            <a:ext cx="1371600" cy="2092881"/>
           </a:xfrm>
           <a:prstGeom prst="rect">
             <a:avLst/>
@@ -16506,7 +17665,7 @@
                 </a:solidFill>
                 <a:latin typeface="Calibri" panose="020F0502020204030204"/>
               </a:rPr>
-              <a:t>Sailboat Physics</a:t>
+              <a:t>Sailboat Simulation</a:t>
             </a:r>
             <a:endParaRPr kumimoji="0" lang="en-US" sz="1300" b="0" i="0" u="none" strike="noStrike" kern="1200" cap="none" spc="0" normalizeH="0" baseline="0" noProof="0" dirty="0">
               <a:ln>
@@ -16546,7 +17705,7 @@
                 <a:noFill/>
               </a:ln>
               <a:solidFill>
-                <a:prstClr val="white"/>
+                <a:schemeClr val="bg1"/>
               </a:solidFill>
               <a:effectLst/>
               <a:uLnTx/>
@@ -16892,7 +18051,7 @@
         <p:spPr>
           <a:xfrm>
             <a:off x="0" y="1375962"/>
-            <a:ext cx="1371600" cy="1892826"/>
+            <a:ext cx="1371600" cy="2092881"/>
           </a:xfrm>
           <a:prstGeom prst="rect">
             <a:avLst/>
@@ -17073,7 +18232,7 @@
                 </a:solidFill>
                 <a:latin typeface="Calibri" panose="020F0502020204030204"/>
               </a:rPr>
-              <a:t>Sailboat Physics</a:t>
+              <a:t>Sailboat Simulation</a:t>
             </a:r>
             <a:endParaRPr kumimoji="0" lang="en-US" sz="1300" b="0" i="0" u="none" strike="noStrike" kern="1200" cap="none" spc="0" normalizeH="0" baseline="0" noProof="0" dirty="0">
               <a:ln>
@@ -17520,7 +18679,7 @@
         <p:spPr>
           <a:xfrm>
             <a:off x="0" y="1375962"/>
-            <a:ext cx="1371600" cy="1892826"/>
+            <a:ext cx="1371600" cy="2092881"/>
           </a:xfrm>
           <a:prstGeom prst="rect">
             <a:avLst/>
@@ -17701,7 +18860,7 @@
                 </a:solidFill>
                 <a:latin typeface="Calibri" panose="020F0502020204030204"/>
               </a:rPr>
-              <a:t>Sailboat Physics</a:t>
+              <a:t>Sailboat Simulation</a:t>
             </a:r>
             <a:endParaRPr kumimoji="0" lang="en-US" sz="1300" b="0" i="0" u="none" strike="noStrike" kern="1200" cap="none" spc="0" normalizeH="0" baseline="0" noProof="0" dirty="0">
               <a:ln>
@@ -18221,7 +19380,7 @@
         <p:spPr>
           <a:xfrm>
             <a:off x="0" y="1375962"/>
-            <a:ext cx="1371600" cy="1892826"/>
+            <a:ext cx="1371600" cy="2092881"/>
           </a:xfrm>
           <a:prstGeom prst="rect">
             <a:avLst/>
@@ -18402,7 +19561,7 @@
                 </a:solidFill>
                 <a:latin typeface="Calibri" panose="020F0502020204030204"/>
               </a:rPr>
-              <a:t>Sailboat Physics</a:t>
+              <a:t>Sailboat Simulation</a:t>
             </a:r>
             <a:endParaRPr kumimoji="0" lang="en-US" sz="1300" b="0" i="0" u="none" strike="noStrike" kern="1200" cap="none" spc="0" normalizeH="0" baseline="0" noProof="0" dirty="0">
               <a:ln>
@@ -18800,7 +19959,7 @@
         <p:spPr>
           <a:xfrm>
             <a:off x="0" y="1375962"/>
-            <a:ext cx="1371600" cy="1892826"/>
+            <a:ext cx="1371600" cy="2092881"/>
           </a:xfrm>
           <a:prstGeom prst="rect">
             <a:avLst/>
@@ -18981,7 +20140,7 @@
                 </a:solidFill>
                 <a:latin typeface="Calibri" panose="020F0502020204030204"/>
               </a:rPr>
-              <a:t>Sailboat Physics</a:t>
+              <a:t>Sailboat Simulation</a:t>
             </a:r>
             <a:endParaRPr kumimoji="0" lang="en-US" sz="1300" b="0" i="0" u="none" strike="noStrike" kern="1200" cap="none" spc="0" normalizeH="0" baseline="0" noProof="0" dirty="0">
               <a:ln>
@@ -20179,6 +21338,17 @@
 </file>
 
 <file path=customXml/item1.xml><?xml version="1.0" encoding="utf-8"?>
+<p:properties xmlns:p="http://schemas.microsoft.com/office/2006/metadata/properties" xmlns:xsi="http://www.w3.org/2001/XMLSchema-instance" xmlns:pc="http://schemas.microsoft.com/office/infopath/2007/PartnerControls">
+  <documentManagement>
+    <lcf76f155ced4ddcb4097134ff3c332f xmlns="1e98583d-296d-4508-869b-1aaa9c64d05f">
+      <Terms xmlns="http://schemas.microsoft.com/office/infopath/2007/PartnerControls"/>
+    </lcf76f155ced4ddcb4097134ff3c332f>
+    <TaxCatchAll xmlns="31df1e79-e94a-48b2-a971-62d876661133" xsi:nil="true"/>
+  </documentManagement>
+</p:properties>
+</file>
+
+<file path=customXml/item2.xml><?xml version="1.0" encoding="utf-8"?>
 <ct:contentTypeSchema xmlns:ct="http://schemas.microsoft.com/office/2006/metadata/contentType" xmlns:ma="http://schemas.microsoft.com/office/2006/metadata/properties/metaAttributes" ct:_="" ma:_="" ma:contentTypeName="Document" ma:contentTypeID="0x01010054FB9E2969F7D243AF3C493CAA915A11" ma:contentTypeVersion="15" ma:contentTypeDescription="Create a new document." ma:contentTypeScope="" ma:versionID="72d2e67821c93dd50b71437c8430df4e">
   <xsd:schema xmlns:xsd="http://www.w3.org/2001/XMLSchema" xmlns:xs="http://www.w3.org/2001/XMLSchema" xmlns:p="http://schemas.microsoft.com/office/2006/metadata/properties" xmlns:ns2="1e98583d-296d-4508-869b-1aaa9c64d05f" xmlns:ns3="31df1e79-e94a-48b2-a971-62d876661133" targetNamespace="http://schemas.microsoft.com/office/2006/metadata/properties" ma:root="true" ma:fieldsID="03bbd61470f6630713723fd834ed1617" ns2:_="" ns3:_="">
     <xsd:import namespace="1e98583d-296d-4508-869b-1aaa9c64d05f"/>
@@ -20393,17 +21563,6 @@
 </ct:contentTypeSchema>
 </file>
 
-<file path=customXml/item2.xml><?xml version="1.0" encoding="utf-8"?>
-<p:properties xmlns:p="http://schemas.microsoft.com/office/2006/metadata/properties" xmlns:xsi="http://www.w3.org/2001/XMLSchema-instance" xmlns:pc="http://schemas.microsoft.com/office/infopath/2007/PartnerControls">
-  <documentManagement>
-    <lcf76f155ced4ddcb4097134ff3c332f xmlns="1e98583d-296d-4508-869b-1aaa9c64d05f">
-      <Terms xmlns="http://schemas.microsoft.com/office/infopath/2007/PartnerControls"/>
-    </lcf76f155ced4ddcb4097134ff3c332f>
-    <TaxCatchAll xmlns="31df1e79-e94a-48b2-a971-62d876661133" xsi:nil="true"/>
-  </documentManagement>
-</p:properties>
-</file>
-
 <file path=customXml/item3.xml><?xml version="1.0" encoding="utf-8"?>
 <?mso-contentType ?>
 <FormTemplates xmlns="http://schemas.microsoft.com/sharepoint/v3/contenttype/forms">
@@ -20414,6 +21573,17 @@
 </file>
 
 <file path=customXml/itemProps1.xml><?xml version="1.0" encoding="utf-8"?>
+<ds:datastoreItem xmlns:ds="http://schemas.openxmlformats.org/officeDocument/2006/customXml" ds:itemID="{E21F0FB8-29BC-4438-B861-9FCB00E2BB3D}">
+  <ds:schemaRefs>
+    <ds:schemaRef ds:uri="http://schemas.microsoft.com/office/2006/metadata/properties"/>
+    <ds:schemaRef ds:uri="http://schemas.microsoft.com/office/infopath/2007/PartnerControls"/>
+    <ds:schemaRef ds:uri="1e98583d-296d-4508-869b-1aaa9c64d05f"/>
+    <ds:schemaRef ds:uri="31df1e79-e94a-48b2-a971-62d876661133"/>
+  </ds:schemaRefs>
+</ds:datastoreItem>
+</file>
+
+<file path=customXml/itemProps2.xml><?xml version="1.0" encoding="utf-8"?>
 <ds:datastoreItem xmlns:ds="http://schemas.openxmlformats.org/officeDocument/2006/customXml" ds:itemID="{131ABB0F-1705-4BAE-AE62-34805608D6DD}">
   <ds:schemaRefs>
     <ds:schemaRef ds:uri="http://schemas.microsoft.com/office/2006/metadata/contentType"/>
@@ -20432,17 +21602,6 @@
 </ds:datastoreItem>
 </file>
 
-<file path=customXml/itemProps2.xml><?xml version="1.0" encoding="utf-8"?>
-<ds:datastoreItem xmlns:ds="http://schemas.openxmlformats.org/officeDocument/2006/customXml" ds:itemID="{E21F0FB8-29BC-4438-B861-9FCB00E2BB3D}">
-  <ds:schemaRefs>
-    <ds:schemaRef ds:uri="http://schemas.microsoft.com/office/2006/metadata/properties"/>
-    <ds:schemaRef ds:uri="http://schemas.microsoft.com/office/infopath/2007/PartnerControls"/>
-    <ds:schemaRef ds:uri="1e98583d-296d-4508-869b-1aaa9c64d05f"/>
-    <ds:schemaRef ds:uri="31df1e79-e94a-48b2-a971-62d876661133"/>
-  </ds:schemaRefs>
-</ds:datastoreItem>
-</file>
-
 <file path=customXml/itemProps3.xml><?xml version="1.0" encoding="utf-8"?>
 <ds:datastoreItem xmlns:ds="http://schemas.openxmlformats.org/officeDocument/2006/customXml" ds:itemID="{3B2309E5-AA28-483A-93E4-34F59437CC9C}">
   <ds:schemaRefs>

</xml_diff>